<commit_message>
Fix those god damn format issues
</commit_message>
<xml_diff>
--- a/答辩/正式答辩.pptx
+++ b/答辩/正式答辩.pptx
@@ -5,22 +5,23 @@
     <p:sldMasterId id="2147483648" r:id="rId1"/>
   </p:sldMasterIdLst>
   <p:notesMasterIdLst>
-    <p:notesMasterId r:id="rId6"/>
+    <p:notesMasterId r:id="rId7"/>
   </p:notesMasterIdLst>
   <p:handoutMasterIdLst>
-    <p:handoutMasterId r:id="rId14"/>
+    <p:handoutMasterId r:id="rId15"/>
   </p:handoutMasterIdLst>
   <p:sldIdLst>
     <p:sldId id="256" r:id="rId3"/>
-    <p:sldId id="257" r:id="rId4"/>
-    <p:sldId id="323" r:id="rId5"/>
-    <p:sldId id="263" r:id="rId7"/>
-    <p:sldId id="324" r:id="rId8"/>
-    <p:sldId id="368" r:id="rId9"/>
-    <p:sldId id="367" r:id="rId10"/>
-    <p:sldId id="264" r:id="rId11"/>
-    <p:sldId id="413" r:id="rId12"/>
-    <p:sldId id="414" r:id="rId13"/>
+    <p:sldId id="416" r:id="rId4"/>
+    <p:sldId id="257" r:id="rId5"/>
+    <p:sldId id="323" r:id="rId6"/>
+    <p:sldId id="263" r:id="rId8"/>
+    <p:sldId id="324" r:id="rId9"/>
+    <p:sldId id="368" r:id="rId10"/>
+    <p:sldId id="367" r:id="rId11"/>
+    <p:sldId id="264" r:id="rId12"/>
+    <p:sldId id="413" r:id="rId13"/>
+    <p:sldId id="414" r:id="rId14"/>
   </p:sldIdLst>
   <p:sldSz cx="24384000" cy="13716000"/>
   <p:notesSz cx="6858000" cy="9144000"/>
@@ -513,6 +514,50 @@
 </p:notes>
 </file>
 
+<file path=ppt/notesSlides/notesSlide2.xml><?xml version="1.0" encoding="utf-8"?>
+<p:notes xmlns:a="http://schemas.openxmlformats.org/drawingml/2006/main" xmlns:r="http://schemas.openxmlformats.org/officeDocument/2006/relationships" xmlns:p="http://schemas.openxmlformats.org/presentationml/2006/main">
+  <p:cSld>
+    <p:spTree>
+      <p:nvGrpSpPr>
+        <p:cNvPr id="1" name=""/>
+        <p:cNvGrpSpPr/>
+        <p:nvPr/>
+      </p:nvGrpSpPr>
+      <p:grpSpPr/>
+      <p:sp>
+        <p:nvSpPr>
+          <p:cNvPr id="2" name="幻灯片图像占位符 1"/>
+          <p:cNvSpPr/>
+          <p:nvPr>
+            <p:ph type="sldImg"/>
+          </p:nvPr>
+        </p:nvSpPr>
+        <p:spPr/>
+      </p:sp>
+      <p:sp>
+        <p:nvSpPr>
+          <p:cNvPr id="3" name="文本占位符 2"/>
+          <p:cNvSpPr/>
+          <p:nvPr>
+            <p:ph type="body" idx="1"/>
+          </p:nvPr>
+        </p:nvSpPr>
+        <p:spPr/>
+        <p:txBody>
+          <a:bodyPr/>
+          <a:p>
+            <a:endParaRPr lang="zh-CN" altLang="en-US"/>
+          </a:p>
+        </p:txBody>
+      </p:sp>
+    </p:spTree>
+  </p:cSld>
+  <p:clrMapOvr>
+    <a:masterClrMapping/>
+  </p:clrMapOvr>
+</p:notes>
+</file>
+
 <file path=ppt/slideLayouts/slideLayout1.xml><?xml version="1.0" encoding="utf-8"?>
 <p:sldLayout xmlns:a="http://schemas.openxmlformats.org/drawingml/2006/main" xmlns:r="http://schemas.openxmlformats.org/officeDocument/2006/relationships" xmlns:p="http://schemas.openxmlformats.org/presentationml/2006/main" type="tx">
   <p:cSld name="Başlık ve Altyazı">
@@ -2678,7 +2723,7 @@
         </p:nvSpPr>
         <p:spPr>
           <a:xfrm>
-            <a:off x="10267992" y="7268199"/>
+            <a:off x="10267992" y="10791814"/>
             <a:ext cx="2946400" cy="593725"/>
           </a:xfrm>
           <a:prstGeom prst="rect">
@@ -2720,11 +2765,122 @@
                 <a:cs typeface="+mn-ea"/>
                 <a:sym typeface="+mn-lt"/>
               </a:rPr>
-              <a:t>演讲人：陈齐翔</a:t>
+              <a:t>答辩人：陈齐翔</a:t>
             </a:r>
             <a:endParaRPr lang="zh-CN" altLang="en-US" sz="3200" dirty="0">
               <a:latin typeface="+mn-lt"/>
               <a:ea typeface="+mn-ea"/>
+              <a:cs typeface="+mn-ea"/>
+              <a:sym typeface="+mn-lt"/>
+            </a:endParaRPr>
+          </a:p>
+        </p:txBody>
+      </p:sp>
+      <p:sp>
+        <p:nvSpPr>
+          <p:cNvPr id="3" name="Shape 44"/>
+          <p:cNvSpPr/>
+          <p:nvPr/>
+        </p:nvSpPr>
+        <p:spPr>
+          <a:xfrm>
+            <a:off x="9389152" y="11793844"/>
+            <a:ext cx="4704080" cy="593725"/>
+          </a:xfrm>
+          <a:prstGeom prst="rect">
+            <a:avLst/>
+          </a:prstGeom>
+          <a:ln w="12700">
+            <a:miter lim="400000"/>
+          </a:ln>
+        </p:spPr>
+        <p:txBody>
+          <a:bodyPr wrap="none" lIns="50800" tIns="50800" rIns="50800" bIns="50800" anchor="ctr">
+            <a:spAutoFit/>
+          </a:bodyPr>
+          <a:lstStyle>
+            <a:lvl1pPr>
+              <a:defRPr sz="3000" b="1">
+                <a:solidFill>
+                  <a:srgbClr val="4F5761"/>
+                </a:solidFill>
+                <a:latin typeface="Lato"/>
+                <a:ea typeface="Lato"/>
+                <a:cs typeface="Lato"/>
+                <a:sym typeface="Lato"/>
+              </a:defRPr>
+            </a:lvl1pPr>
+          </a:lstStyle>
+          <a:p>
+            <a:pPr lvl="0">
+              <a:defRPr sz="1800" b="0">
+                <a:solidFill>
+                  <a:srgbClr val="000000"/>
+                </a:solidFill>
+              </a:defRPr>
+            </a:pPr>
+            <a:r>
+              <a:rPr lang="zh-CN" altLang="en-US" sz="3200" dirty="0">
+                <a:latin typeface="+mn-lt"/>
+                <a:ea typeface="+mn-ea"/>
+                <a:cs typeface="+mn-ea"/>
+                <a:sym typeface="+mn-lt"/>
+              </a:rPr>
+              <a:t>指导教师：谢茂强 副教授</a:t>
+            </a:r>
+            <a:endParaRPr lang="zh-CN" altLang="en-US" sz="3200" dirty="0">
+              <a:latin typeface="+mn-lt"/>
+              <a:ea typeface="+mn-ea"/>
+              <a:cs typeface="+mn-ea"/>
+              <a:sym typeface="+mn-lt"/>
+            </a:endParaRPr>
+          </a:p>
+        </p:txBody>
+      </p:sp>
+      <p:sp>
+        <p:nvSpPr>
+          <p:cNvPr id="4" name="Shape 43"/>
+          <p:cNvSpPr/>
+          <p:nvPr/>
+        </p:nvSpPr>
+        <p:spPr>
+          <a:xfrm>
+            <a:off x="2416852" y="7188637"/>
+            <a:ext cx="18648680" cy="716915"/>
+          </a:xfrm>
+          <a:prstGeom prst="rect">
+            <a:avLst/>
+          </a:prstGeom>
+          <a:ln w="12700">
+            <a:miter lim="400000"/>
+          </a:ln>
+        </p:spPr>
+        <p:txBody>
+          <a:bodyPr wrap="none" lIns="50800" tIns="50800" rIns="50800" bIns="50800" anchor="ctr">
+            <a:spAutoFit/>
+          </a:bodyPr>
+          <a:p>
+            <a:pPr lvl="0" algn="ctr">
+              <a:defRPr sz="1800">
+                <a:solidFill>
+                  <a:srgbClr val="000000"/>
+                </a:solidFill>
+              </a:defRPr>
+            </a:pPr>
+            <a:r>
+              <a:rPr lang="zh-CN" altLang="en-US" sz="4000" dirty="0">
+                <a:solidFill>
+                  <a:srgbClr val="4F5761"/>
+                </a:solidFill>
+                <a:cs typeface="+mn-ea"/>
+                <a:sym typeface="+mn-lt"/>
+              </a:rPr>
+              <a:t>Experimental Design and Analysis for Collaborative Linear Manifold Learning</a:t>
+            </a:r>
+            <a:endParaRPr lang="zh-CN" altLang="en-US" sz="4000" dirty="0">
+              <a:solidFill>
+                <a:srgbClr val="4F5761"/>
+              </a:solidFill>
               <a:cs typeface="+mn-ea"/>
               <a:sym typeface="+mn-lt"/>
             </a:endParaRPr>
@@ -2777,6 +2933,1422 @@
       </p:grpSpPr>
       <p:sp>
         <p:nvSpPr>
+          <p:cNvPr id="544" name="Shape 544"/>
+          <p:cNvSpPr>
+            <a:spLocks noGrp="1"/>
+          </p:cNvSpPr>
+          <p:nvPr>
+            <p:ph type="sldNum" sz="quarter" idx="4294967295"/>
+          </p:nvPr>
+        </p:nvSpPr>
+        <p:spPr>
+          <a:xfrm>
+            <a:off x="23848993" y="13015731"/>
+            <a:ext cx="362280" cy="369332"/>
+          </a:xfrm>
+          <a:prstGeom prst="rect">
+            <a:avLst/>
+          </a:prstGeom>
+        </p:spPr>
+        <p:txBody>
+          <a:bodyPr/>
+          <a:lstStyle/>
+          <a:p>
+            <a:pPr lvl="0">
+              <a:defRPr sz="1800">
+                <a:solidFill>
+                  <a:srgbClr val="000000"/>
+                </a:solidFill>
+              </a:defRPr>
+            </a:pPr>
+            <a:fld id="{86CB4B4D-7CA3-9044-876B-883B54F8677D}" type="slidenum">
+              <a:rPr sz="2400">
+                <a:solidFill>
+                  <a:srgbClr val="E6E4E8"/>
+                </a:solidFill>
+                <a:latin typeface="+mn-lt"/>
+                <a:ea typeface="+mn-ea"/>
+                <a:cs typeface="+mn-ea"/>
+                <a:sym typeface="+mn-lt"/>
+              </a:rPr>
+            </a:fld>
+            <a:endParaRPr sz="2400">
+              <a:solidFill>
+                <a:srgbClr val="E6E4E8"/>
+              </a:solidFill>
+              <a:latin typeface="+mn-lt"/>
+              <a:ea typeface="+mn-ea"/>
+              <a:cs typeface="+mn-ea"/>
+              <a:sym typeface="+mn-lt"/>
+            </a:endParaRPr>
+          </a:p>
+        </p:txBody>
+      </p:sp>
+      <p:sp>
+        <p:nvSpPr>
+          <p:cNvPr id="546" name="Shape 546"/>
+          <p:cNvSpPr/>
+          <p:nvPr/>
+        </p:nvSpPr>
+        <p:spPr>
+          <a:xfrm>
+            <a:off x="891400" y="990127"/>
+            <a:ext cx="23713401" cy="778510"/>
+          </a:xfrm>
+          <a:prstGeom prst="rect">
+            <a:avLst/>
+          </a:prstGeom>
+          <a:ln w="12700">
+            <a:miter lim="400000"/>
+          </a:ln>
+        </p:spPr>
+        <p:txBody>
+          <a:bodyPr lIns="50800" tIns="50800" rIns="50800" bIns="50800" anchor="ctr">
+            <a:spAutoFit/>
+          </a:bodyPr>
+          <a:lstStyle/>
+          <a:p>
+            <a:pPr lvl="0" algn="l">
+              <a:defRPr sz="1800">
+                <a:solidFill>
+                  <a:srgbClr val="000000"/>
+                </a:solidFill>
+              </a:defRPr>
+            </a:pPr>
+            <a:r>
+              <a:rPr lang="zh-CN" sz="4400">
+                <a:solidFill>
+                  <a:srgbClr val="6F1F35"/>
+                </a:solidFill>
+                <a:cs typeface="+mn-ea"/>
+                <a:sym typeface="+mn-lt"/>
+              </a:rPr>
+              <a:t>实验三：案例分析</a:t>
+            </a:r>
+            <a:r>
+              <a:rPr lang="en-US" altLang="zh-CN" sz="4400">
+                <a:solidFill>
+                  <a:srgbClr val="6F1F35"/>
+                </a:solidFill>
+                <a:cs typeface="+mn-ea"/>
+                <a:sym typeface="+mn-lt"/>
+              </a:rPr>
+              <a:t>&amp;</a:t>
+            </a:r>
+            <a:r>
+              <a:rPr lang="zh-CN" altLang="en-US" sz="4400">
+                <a:solidFill>
+                  <a:srgbClr val="6F1F35"/>
+                </a:solidFill>
+                <a:cs typeface="+mn-ea"/>
+                <a:sym typeface="+mn-lt"/>
+              </a:rPr>
+              <a:t>网络可视化</a:t>
+            </a:r>
+            <a:endParaRPr sz="4400">
+              <a:solidFill>
+                <a:srgbClr val="6F1F35"/>
+              </a:solidFill>
+              <a:cs typeface="+mn-ea"/>
+              <a:sym typeface="+mn-lt"/>
+            </a:endParaRPr>
+          </a:p>
+        </p:txBody>
+      </p:sp>
+      <p:sp>
+        <p:nvSpPr>
+          <p:cNvPr id="547" name="Shape 547"/>
+          <p:cNvSpPr/>
+          <p:nvPr/>
+        </p:nvSpPr>
+        <p:spPr>
+          <a:xfrm flipV="1">
+            <a:off x="458807" y="7562468"/>
+            <a:ext cx="23466386" cy="1"/>
+          </a:xfrm>
+          <a:prstGeom prst="line">
+            <a:avLst/>
+          </a:prstGeom>
+          <a:ln w="50800">
+            <a:solidFill>
+              <a:srgbClr val="6F1F35"/>
+            </a:solidFill>
+            <a:prstDash val="sysDot"/>
+            <a:miter lim="400000"/>
+          </a:ln>
+        </p:spPr>
+        <p:txBody>
+          <a:bodyPr lIns="0" tIns="0" rIns="0" bIns="0" anchor="ctr"/>
+          <a:lstStyle/>
+          <a:p>
+            <a:pPr lvl="0">
+              <a:defRPr sz="3600"/>
+            </a:pPr>
+            <a:endParaRPr>
+              <a:cs typeface="+mn-ea"/>
+              <a:sym typeface="+mn-lt"/>
+            </a:endParaRPr>
+          </a:p>
+        </p:txBody>
+      </p:sp>
+      <p:sp>
+        <p:nvSpPr>
+          <p:cNvPr id="548" name="Shape 548"/>
+          <p:cNvSpPr/>
+          <p:nvPr/>
+        </p:nvSpPr>
+        <p:spPr>
+          <a:xfrm>
+            <a:off x="10619105" y="3818890"/>
+            <a:ext cx="5528310" cy="2153920"/>
+          </a:xfrm>
+          <a:prstGeom prst="rect">
+            <a:avLst/>
+          </a:prstGeom>
+          <a:ln w="12700">
+            <a:miter lim="400000"/>
+          </a:ln>
+        </p:spPr>
+        <p:txBody>
+          <a:bodyPr wrap="square" lIns="0" tIns="0" rIns="0" bIns="0">
+            <a:spAutoFit/>
+          </a:bodyPr>
+          <a:lstStyle>
+            <a:lvl1pPr algn="l">
+              <a:defRPr sz="2400">
+                <a:solidFill>
+                  <a:srgbClr val="4F5761"/>
+                </a:solidFill>
+                <a:latin typeface="Lato"/>
+                <a:ea typeface="Lato"/>
+                <a:cs typeface="Lato"/>
+                <a:sym typeface="Lato"/>
+              </a:defRPr>
+            </a:lvl1pPr>
+          </a:lstStyle>
+          <a:p>
+            <a:pPr lvl="0">
+              <a:defRPr sz="1800">
+                <a:solidFill>
+                  <a:srgbClr val="000000"/>
+                </a:solidFill>
+              </a:defRPr>
+            </a:pPr>
+            <a:r>
+              <a:rPr lang="zh-CN" sz="2800">
+                <a:solidFill>
+                  <a:srgbClr val="4F5761"/>
+                </a:solidFill>
+                <a:latin typeface="+mn-lt"/>
+                <a:ea typeface="+mn-ea"/>
+                <a:cs typeface="+mn-ea"/>
+                <a:sym typeface="+mn-lt"/>
+              </a:rPr>
+              <a:t>我们以药物</a:t>
+            </a:r>
+            <a:r>
+              <a:rPr lang="en-US" altLang="zh-CN" sz="2800">
+                <a:solidFill>
+                  <a:srgbClr val="4F5761"/>
+                </a:solidFill>
+                <a:latin typeface="+mn-lt"/>
+                <a:ea typeface="+mn-ea"/>
+                <a:cs typeface="+mn-ea"/>
+                <a:sym typeface="+mn-lt"/>
+              </a:rPr>
+              <a:t>-</a:t>
+            </a:r>
+            <a:r>
+              <a:rPr lang="zh-CN" altLang="en-US" sz="2800">
+                <a:solidFill>
+                  <a:srgbClr val="4F5761"/>
+                </a:solidFill>
+                <a:latin typeface="+mn-lt"/>
+                <a:ea typeface="+mn-ea"/>
+                <a:cs typeface="+mn-ea"/>
+                <a:sym typeface="+mn-lt"/>
+              </a:rPr>
+              <a:t>药物关联数据为例，挑选出了预测出的</a:t>
+            </a:r>
+            <a:r>
+              <a:rPr lang="zh-CN" altLang="en-US" sz="2800">
+                <a:solidFill>
+                  <a:srgbClr val="4F5761"/>
+                </a:solidFill>
+                <a:latin typeface="+mn-lt"/>
+                <a:ea typeface="+mn-ea"/>
+                <a:cs typeface="+mn-ea"/>
+                <a:sym typeface="+mn-lt"/>
+              </a:rPr>
+              <a:t>前十个最有可能发生的关联（非先验数据），表中加粗行代表通过其它渠道被验证为真实存在的药物间关联。</a:t>
+            </a:r>
+            <a:endParaRPr lang="zh-CN" altLang="en-US" sz="2800">
+              <a:solidFill>
+                <a:srgbClr val="4F5761"/>
+              </a:solidFill>
+              <a:latin typeface="+mn-lt"/>
+              <a:ea typeface="+mn-ea"/>
+              <a:cs typeface="+mn-ea"/>
+              <a:sym typeface="+mn-lt"/>
+            </a:endParaRPr>
+          </a:p>
+        </p:txBody>
+      </p:sp>
+      <p:sp>
+        <p:nvSpPr>
+          <p:cNvPr id="549" name="Shape 549"/>
+          <p:cNvSpPr/>
+          <p:nvPr/>
+        </p:nvSpPr>
+        <p:spPr>
+          <a:xfrm>
+            <a:off x="16963672" y="3603582"/>
+            <a:ext cx="5650472" cy="2585085"/>
+          </a:xfrm>
+          <a:prstGeom prst="rect">
+            <a:avLst/>
+          </a:prstGeom>
+          <a:ln w="12700">
+            <a:miter lim="400000"/>
+          </a:ln>
+        </p:spPr>
+        <p:txBody>
+          <a:bodyPr lIns="0" tIns="0" rIns="0" bIns="0">
+            <a:spAutoFit/>
+          </a:bodyPr>
+          <a:lstStyle>
+            <a:lvl1pPr algn="l">
+              <a:defRPr sz="2000">
+                <a:solidFill>
+                  <a:srgbClr val="4F5761"/>
+                </a:solidFill>
+                <a:latin typeface="Lato Light"/>
+                <a:ea typeface="Lato Light"/>
+                <a:cs typeface="Lato Light"/>
+                <a:sym typeface="Lato Light"/>
+              </a:defRPr>
+            </a:lvl1pPr>
+          </a:lstStyle>
+          <a:p>
+            <a:pPr lvl="0">
+              <a:defRPr sz="1800">
+                <a:solidFill>
+                  <a:srgbClr val="000000"/>
+                </a:solidFill>
+              </a:defRPr>
+            </a:pPr>
+            <a:r>
+              <a:rPr lang="zh-CN" sz="2800">
+                <a:solidFill>
+                  <a:srgbClr val="4F5761"/>
+                </a:solidFill>
+                <a:latin typeface="+mn-lt"/>
+                <a:ea typeface="+mn-ea"/>
+                <a:cs typeface="+mn-ea"/>
+                <a:sym typeface="+mn-lt"/>
+              </a:rPr>
+              <a:t>表中第七行我们预测出了一例帕罗西丁和盐酸多奈哌齐的相互作用。其中，前者是一类被广泛认为极易发生药物互作的抗抑郁药物，它和后者共同使用时会抑制药物的代谢作用，从而相互影响药效。</a:t>
+            </a:r>
+            <a:endParaRPr lang="zh-CN" sz="2800">
+              <a:solidFill>
+                <a:srgbClr val="4F5761"/>
+              </a:solidFill>
+              <a:latin typeface="+mn-lt"/>
+              <a:ea typeface="+mn-ea"/>
+              <a:cs typeface="+mn-ea"/>
+              <a:sym typeface="+mn-lt"/>
+            </a:endParaRPr>
+          </a:p>
+        </p:txBody>
+      </p:sp>
+      <p:sp>
+        <p:nvSpPr>
+          <p:cNvPr id="551" name="Shape 551"/>
+          <p:cNvSpPr/>
+          <p:nvPr/>
+        </p:nvSpPr>
+        <p:spPr>
+          <a:xfrm>
+            <a:off x="2694305" y="10090150"/>
+            <a:ext cx="7555230" cy="1723390"/>
+          </a:xfrm>
+          <a:prstGeom prst="rect">
+            <a:avLst/>
+          </a:prstGeom>
+          <a:ln w="12700">
+            <a:miter lim="400000"/>
+          </a:ln>
+        </p:spPr>
+        <p:txBody>
+          <a:bodyPr wrap="square" lIns="0" tIns="0" rIns="0" bIns="0">
+            <a:spAutoFit/>
+          </a:bodyPr>
+          <a:lstStyle>
+            <a:lvl1pPr algn="l">
+              <a:defRPr sz="2000">
+                <a:solidFill>
+                  <a:srgbClr val="4F5761"/>
+                </a:solidFill>
+                <a:latin typeface="Lato Light"/>
+                <a:ea typeface="Lato Light"/>
+                <a:cs typeface="Lato Light"/>
+                <a:sym typeface="Lato Light"/>
+              </a:defRPr>
+            </a:lvl1pPr>
+          </a:lstStyle>
+          <a:p>
+            <a:pPr lvl="0">
+              <a:defRPr sz="1800">
+                <a:solidFill>
+                  <a:srgbClr val="000000"/>
+                </a:solidFill>
+              </a:defRPr>
+            </a:pPr>
+            <a:r>
+              <a:rPr lang="zh-CN" sz="2800">
+                <a:solidFill>
+                  <a:srgbClr val="4F5761"/>
+                </a:solidFill>
+                <a:latin typeface="+mn-lt"/>
+                <a:ea typeface="+mn-ea"/>
+                <a:cs typeface="+mn-ea"/>
+                <a:sym typeface="+mn-lt"/>
+              </a:rPr>
+              <a:t>以表中涉及的药物为例，我们找到了与之相关的所有药物并画出了如右图所示的药物</a:t>
+            </a:r>
+            <a:r>
+              <a:rPr lang="en-US" altLang="zh-CN" sz="2800">
+                <a:solidFill>
+                  <a:srgbClr val="4F5761"/>
+                </a:solidFill>
+                <a:latin typeface="+mn-lt"/>
+                <a:ea typeface="+mn-ea"/>
+                <a:cs typeface="+mn-ea"/>
+                <a:sym typeface="+mn-lt"/>
+              </a:rPr>
+              <a:t>-</a:t>
+            </a:r>
+            <a:r>
+              <a:rPr lang="zh-CN" altLang="en-US" sz="2800">
+                <a:solidFill>
+                  <a:srgbClr val="4F5761"/>
+                </a:solidFill>
+                <a:latin typeface="+mn-lt"/>
+                <a:ea typeface="+mn-ea"/>
+                <a:cs typeface="+mn-ea"/>
+                <a:sym typeface="+mn-lt"/>
+              </a:rPr>
+              <a:t>药物关联网络。从图中可直观地看出药物之间的关联以及其它相关信息。</a:t>
+            </a:r>
+            <a:endParaRPr lang="zh-CN" altLang="en-US" sz="2800">
+              <a:solidFill>
+                <a:srgbClr val="4F5761"/>
+              </a:solidFill>
+              <a:latin typeface="+mn-lt"/>
+              <a:ea typeface="+mn-ea"/>
+              <a:cs typeface="+mn-ea"/>
+              <a:sym typeface="+mn-lt"/>
+            </a:endParaRPr>
+          </a:p>
+        </p:txBody>
+      </p:sp>
+      <p:pic>
+        <p:nvPicPr>
+          <p:cNvPr id="495" name="network.pdf" descr="network.pdf"/>
+          <p:cNvPicPr>
+            <a:picLocks noChangeAspect="1"/>
+          </p:cNvPicPr>
+          <p:nvPr/>
+        </p:nvPicPr>
+        <p:blipFill>
+          <a:blip r:embed="rId1"/>
+          <a:srcRect l="3476" r="3476"/>
+          <a:stretch>
+            <a:fillRect/>
+          </a:stretch>
+        </p:blipFill>
+        <p:spPr>
+          <a:xfrm>
+            <a:off x="12619355" y="7973060"/>
+            <a:ext cx="10309225" cy="5412105"/>
+          </a:xfrm>
+          <a:prstGeom prst="rect">
+            <a:avLst/>
+          </a:prstGeom>
+          <a:ln w="12700">
+            <a:miter lim="400000"/>
+            <a:headEnd/>
+            <a:tailEnd/>
+          </a:ln>
+        </p:spPr>
+      </p:pic>
+      <p:graphicFrame>
+        <p:nvGraphicFramePr>
+          <p:cNvPr id="3" name="表格 2"/>
+          <p:cNvGraphicFramePr/>
+          <p:nvPr/>
+        </p:nvGraphicFramePr>
+        <p:xfrm>
+          <a:off x="662305" y="2150745"/>
+          <a:ext cx="9465310" cy="5029200"/>
+        </p:xfrm>
+        <a:graphic>
+          <a:graphicData uri="http://schemas.openxmlformats.org/drawingml/2006/table">
+            <a:tbl>
+              <a:tblPr firstRow="1" bandRow="1">
+                <a:tableStyleId>{5C22544A-7EE6-4342-B048-85BDC9FD1C3A}</a:tableStyleId>
+              </a:tblPr>
+              <a:tblGrid>
+                <a:gridCol w="1617980"/>
+                <a:gridCol w="3346450"/>
+                <a:gridCol w="4500880"/>
+              </a:tblGrid>
+              <a:tr h="457200">
+                <a:tc>
+                  <a:txBody>
+                    <a:bodyPr/>
+                    <a:p>
+                      <a:pPr>
+                        <a:buNone/>
+                      </a:pPr>
+                      <a:r>
+                        <a:rPr lang="zh-CN" altLang="en-US"/>
+                        <a:t>概率排名</a:t>
+                      </a:r>
+                      <a:endParaRPr lang="zh-CN" altLang="en-US"/>
+                    </a:p>
+                  </a:txBody>
+                  <a:tcPr/>
+                </a:tc>
+                <a:tc>
+                  <a:txBody>
+                    <a:bodyPr/>
+                    <a:p>
+                      <a:pPr>
+                        <a:buNone/>
+                      </a:pPr>
+                      <a:r>
+                        <a:rPr lang="en-US" altLang="zh-CN"/>
+                        <a:t>DrugBank</a:t>
+                      </a:r>
+                      <a:r>
+                        <a:rPr lang="zh-CN" altLang="en-US"/>
+                        <a:t>编号</a:t>
+                      </a:r>
+                      <a:endParaRPr lang="zh-CN" altLang="en-US"/>
+                    </a:p>
+                  </a:txBody>
+                  <a:tcPr/>
+                </a:tc>
+                <a:tc>
+                  <a:txBody>
+                    <a:bodyPr/>
+                    <a:p>
+                      <a:pPr>
+                        <a:buNone/>
+                      </a:pPr>
+                      <a:r>
+                        <a:rPr lang="zh-CN" altLang="en-US"/>
+                        <a:t>药品名称</a:t>
+                      </a:r>
+                      <a:endParaRPr lang="zh-CN" altLang="en-US"/>
+                    </a:p>
+                  </a:txBody>
+                  <a:tcPr/>
+                </a:tc>
+              </a:tr>
+              <a:tr h="457200">
+                <a:tc>
+                  <a:txBody>
+                    <a:bodyPr/>
+                    <a:p>
+                      <a:pPr>
+                        <a:buNone/>
+                      </a:pPr>
+                      <a:r>
+                        <a:rPr lang="en-US" altLang="zh-CN" b="1"/>
+                        <a:t>1</a:t>
+                      </a:r>
+                      <a:endParaRPr lang="en-US" altLang="zh-CN" b="1"/>
+                    </a:p>
+                  </a:txBody>
+                  <a:tcPr/>
+                </a:tc>
+                <a:tc>
+                  <a:txBody>
+                    <a:bodyPr/>
+                    <a:p>
+                      <a:pPr>
+                        <a:buNone/>
+                      </a:pPr>
+                      <a:r>
+                        <a:rPr lang="en-US" altLang="zh-CN" b="1"/>
+                        <a:t>DB00777,DB00674</a:t>
+                      </a:r>
+                      <a:endParaRPr lang="en-US" altLang="zh-CN" b="1"/>
+                    </a:p>
+                  </a:txBody>
+                  <a:tcPr/>
+                </a:tc>
+                <a:tc>
+                  <a:txBody>
+                    <a:bodyPr/>
+                    <a:p>
+                      <a:pPr algn="l">
+                        <a:buNone/>
+                      </a:pPr>
+                      <a:r>
+                        <a:rPr lang="en-US" altLang="zh-CN" b="1"/>
+                        <a:t>Propiomazine,Galantamin</a:t>
+                      </a:r>
+                      <a:endParaRPr lang="en-US" altLang="zh-CN" b="1"/>
+                    </a:p>
+                  </a:txBody>
+                  <a:tcPr/>
+                </a:tc>
+              </a:tr>
+              <a:tr h="457200">
+                <a:tc>
+                  <a:txBody>
+                    <a:bodyPr/>
+                    <a:p>
+                      <a:pPr>
+                        <a:buNone/>
+                      </a:pPr>
+                      <a:r>
+                        <a:rPr lang="en-US" altLang="zh-CN" b="1"/>
+                        <a:t>2</a:t>
+                      </a:r>
+                      <a:endParaRPr lang="en-US" altLang="zh-CN" b="1"/>
+                    </a:p>
+                  </a:txBody>
+                  <a:tcPr/>
+                </a:tc>
+                <a:tc>
+                  <a:txBody>
+                    <a:bodyPr/>
+                    <a:p>
+                      <a:pPr>
+                        <a:buNone/>
+                      </a:pPr>
+                      <a:r>
+                        <a:rPr lang="en-US" altLang="zh-CN" b="1"/>
+                        <a:t>DB01238,DB00674</a:t>
+                      </a:r>
+                      <a:endParaRPr lang="en-US" altLang="zh-CN" b="1"/>
+                    </a:p>
+                  </a:txBody>
+                  <a:tcPr/>
+                </a:tc>
+                <a:tc>
+                  <a:txBody>
+                    <a:bodyPr/>
+                    <a:p>
+                      <a:pPr algn="l">
+                        <a:buNone/>
+                      </a:pPr>
+                      <a:r>
+                        <a:rPr lang="en-US" altLang="zh-CN" b="1"/>
+                        <a:t>Aripiprazole,</a:t>
+                      </a:r>
+                      <a:r>
+                        <a:rPr lang="en-US" altLang="zh-CN" sz="2400" b="1">
+                          <a:sym typeface="+mn-ea"/>
+                        </a:rPr>
+                        <a:t>Galantamin</a:t>
+                      </a:r>
+                      <a:endParaRPr lang="en-US" altLang="zh-CN" b="1"/>
+                    </a:p>
+                  </a:txBody>
+                  <a:tcPr/>
+                </a:tc>
+              </a:tr>
+              <a:tr h="457200">
+                <a:tc>
+                  <a:txBody>
+                    <a:bodyPr/>
+                    <a:p>
+                      <a:pPr>
+                        <a:buNone/>
+                      </a:pPr>
+                      <a:r>
+                        <a:rPr lang="en-US" altLang="zh-CN" b="1"/>
+                        <a:t>3</a:t>
+                      </a:r>
+                      <a:endParaRPr lang="en-US" altLang="zh-CN" b="1"/>
+                    </a:p>
+                  </a:txBody>
+                  <a:tcPr/>
+                </a:tc>
+                <a:tc>
+                  <a:txBody>
+                    <a:bodyPr/>
+                    <a:p>
+                      <a:pPr>
+                        <a:buNone/>
+                      </a:pPr>
+                      <a:r>
+                        <a:rPr lang="en-US" altLang="zh-CN" b="1"/>
+                        <a:t>DB00777,DB00843</a:t>
+                      </a:r>
+                      <a:endParaRPr lang="en-US" altLang="zh-CN" b="1"/>
+                    </a:p>
+                  </a:txBody>
+                  <a:tcPr/>
+                </a:tc>
+                <a:tc>
+                  <a:txBody>
+                    <a:bodyPr/>
+                    <a:p>
+                      <a:pPr algn="l">
+                        <a:buNone/>
+                      </a:pPr>
+                      <a:r>
+                        <a:rPr lang="en-US" altLang="zh-CN" sz="2400" b="1">
+                          <a:sym typeface="+mn-ea"/>
+                        </a:rPr>
+                        <a:t>Propiomazine,</a:t>
+                      </a:r>
+                      <a:r>
+                        <a:rPr lang="en-US" altLang="zh-CN" sz="2400" b="1">
+                          <a:solidFill>
+                            <a:srgbClr val="00B050"/>
+                          </a:solidFill>
+                          <a:sym typeface="+mn-ea"/>
+                        </a:rPr>
+                        <a:t>Donepezil</a:t>
+                      </a:r>
+                      <a:endParaRPr lang="en-US" altLang="zh-CN" sz="2400" b="1">
+                        <a:solidFill>
+                          <a:srgbClr val="00B050"/>
+                        </a:solidFill>
+                        <a:sym typeface="+mn-ea"/>
+                      </a:endParaRPr>
+                    </a:p>
+                  </a:txBody>
+                  <a:tcPr/>
+                </a:tc>
+              </a:tr>
+              <a:tr h="457200">
+                <a:tc>
+                  <a:txBody>
+                    <a:bodyPr/>
+                    <a:p>
+                      <a:pPr>
+                        <a:buNone/>
+                      </a:pPr>
+                      <a:r>
+                        <a:rPr lang="en-US" altLang="zh-CN">
+                          <a:solidFill>
+                            <a:schemeClr val="bg1">
+                              <a:lumMod val="50000"/>
+                              <a:lumOff val="50000"/>
+                            </a:schemeClr>
+                          </a:solidFill>
+                        </a:rPr>
+                        <a:t>4</a:t>
+                      </a:r>
+                      <a:endParaRPr lang="en-US" altLang="zh-CN">
+                        <a:solidFill>
+                          <a:schemeClr val="bg1">
+                            <a:lumMod val="50000"/>
+                            <a:lumOff val="50000"/>
+                          </a:schemeClr>
+                        </a:solidFill>
+                      </a:endParaRPr>
+                    </a:p>
+                  </a:txBody>
+                  <a:tcPr/>
+                </a:tc>
+                <a:tc>
+                  <a:txBody>
+                    <a:bodyPr/>
+                    <a:p>
+                      <a:pPr>
+                        <a:buNone/>
+                      </a:pPr>
+                      <a:r>
+                        <a:rPr lang="en-US" altLang="zh-CN">
+                          <a:solidFill>
+                            <a:schemeClr val="bg1">
+                              <a:lumMod val="50000"/>
+                              <a:lumOff val="50000"/>
+                            </a:schemeClr>
+                          </a:solidFill>
+                        </a:rPr>
+                        <a:t>DB00715,DB00382</a:t>
+                      </a:r>
+                      <a:endParaRPr lang="en-US" altLang="zh-CN">
+                        <a:solidFill>
+                          <a:schemeClr val="bg1">
+                            <a:lumMod val="50000"/>
+                            <a:lumOff val="50000"/>
+                          </a:schemeClr>
+                        </a:solidFill>
+                      </a:endParaRPr>
+                    </a:p>
+                  </a:txBody>
+                  <a:tcPr/>
+                </a:tc>
+                <a:tc>
+                  <a:txBody>
+                    <a:bodyPr/>
+                    <a:p>
+                      <a:pPr algn="l">
+                        <a:buNone/>
+                      </a:pPr>
+                      <a:r>
+                        <a:rPr lang="en-US" altLang="zh-CN">
+                          <a:solidFill>
+                            <a:srgbClr val="C00000"/>
+                          </a:solidFill>
+                        </a:rPr>
+                        <a:t>Paroxetine</a:t>
+                      </a:r>
+                      <a:r>
+                        <a:rPr lang="en-US" altLang="zh-CN">
+                          <a:solidFill>
+                            <a:schemeClr val="bg1">
+                              <a:lumMod val="50000"/>
+                              <a:lumOff val="50000"/>
+                            </a:schemeClr>
+                          </a:solidFill>
+                        </a:rPr>
+                        <a:t>,Tacrine</a:t>
+                      </a:r>
+                      <a:endParaRPr lang="en-US" altLang="zh-CN">
+                        <a:solidFill>
+                          <a:schemeClr val="bg1">
+                            <a:lumMod val="50000"/>
+                            <a:lumOff val="50000"/>
+                          </a:schemeClr>
+                        </a:solidFill>
+                      </a:endParaRPr>
+                    </a:p>
+                  </a:txBody>
+                  <a:tcPr/>
+                </a:tc>
+              </a:tr>
+              <a:tr h="457200">
+                <a:tc>
+                  <a:txBody>
+                    <a:bodyPr/>
+                    <a:p>
+                      <a:pPr>
+                        <a:buNone/>
+                      </a:pPr>
+                      <a:r>
+                        <a:rPr lang="en-US" altLang="zh-CN" b="1"/>
+                        <a:t>5</a:t>
+                      </a:r>
+                      <a:endParaRPr lang="en-US" altLang="zh-CN" b="1"/>
+                    </a:p>
+                  </a:txBody>
+                  <a:tcPr/>
+                </a:tc>
+                <a:tc>
+                  <a:txBody>
+                    <a:bodyPr/>
+                    <a:p>
+                      <a:pPr>
+                        <a:buNone/>
+                      </a:pPr>
+                      <a:r>
+                        <a:rPr lang="en-US" altLang="zh-CN" b="1"/>
+                        <a:t>DB00777,DB00382</a:t>
+                      </a:r>
+                      <a:endParaRPr lang="en-US" altLang="zh-CN" b="1"/>
+                    </a:p>
+                  </a:txBody>
+                  <a:tcPr/>
+                </a:tc>
+                <a:tc>
+                  <a:txBody>
+                    <a:bodyPr/>
+                    <a:p>
+                      <a:pPr algn="l">
+                        <a:buNone/>
+                      </a:pPr>
+                      <a:r>
+                        <a:rPr lang="en-US" altLang="zh-CN" b="1"/>
+                        <a:t>Propiomazine,Tacrine</a:t>
+                      </a:r>
+                      <a:endParaRPr lang="en-US" altLang="zh-CN" b="1"/>
+                    </a:p>
+                  </a:txBody>
+                  <a:tcPr/>
+                </a:tc>
+              </a:tr>
+              <a:tr h="457200">
+                <a:tc>
+                  <a:txBody>
+                    <a:bodyPr/>
+                    <a:p>
+                      <a:pPr>
+                        <a:buNone/>
+                      </a:pPr>
+                      <a:r>
+                        <a:rPr lang="en-US" altLang="zh-CN" b="1"/>
+                        <a:t>6</a:t>
+                      </a:r>
+                      <a:endParaRPr lang="en-US" altLang="zh-CN" b="1"/>
+                    </a:p>
+                  </a:txBody>
+                  <a:tcPr/>
+                </a:tc>
+                <a:tc>
+                  <a:txBody>
+                    <a:bodyPr/>
+                    <a:p>
+                      <a:pPr>
+                        <a:buNone/>
+                      </a:pPr>
+                      <a:r>
+                        <a:rPr lang="en-US" altLang="zh-CN" b="1"/>
+                        <a:t>DB01238,DB00843</a:t>
+                      </a:r>
+                      <a:endParaRPr lang="en-US" altLang="zh-CN" b="1"/>
+                    </a:p>
+                  </a:txBody>
+                  <a:tcPr/>
+                </a:tc>
+                <a:tc>
+                  <a:txBody>
+                    <a:bodyPr/>
+                    <a:p>
+                      <a:pPr algn="l">
+                        <a:buNone/>
+                      </a:pPr>
+                      <a:r>
+                        <a:rPr lang="en-US" altLang="zh-CN" b="1"/>
+                        <a:t>Aripiprazole,</a:t>
+                      </a:r>
+                      <a:r>
+                        <a:rPr lang="en-US" altLang="zh-CN" b="1">
+                          <a:solidFill>
+                            <a:srgbClr val="00B050"/>
+                          </a:solidFill>
+                        </a:rPr>
+                        <a:t>Donepezil</a:t>
+                      </a:r>
+                      <a:endParaRPr lang="en-US" altLang="zh-CN" b="1">
+                        <a:solidFill>
+                          <a:srgbClr val="00B050"/>
+                        </a:solidFill>
+                      </a:endParaRPr>
+                    </a:p>
+                  </a:txBody>
+                  <a:tcPr/>
+                </a:tc>
+              </a:tr>
+              <a:tr h="457200">
+                <a:tc>
+                  <a:txBody>
+                    <a:bodyPr/>
+                    <a:p>
+                      <a:pPr>
+                        <a:buNone/>
+                      </a:pPr>
+                      <a:r>
+                        <a:rPr lang="en-US" altLang="zh-CN" b="1"/>
+                        <a:t>7</a:t>
+                      </a:r>
+                      <a:endParaRPr lang="en-US" altLang="zh-CN" b="1"/>
+                    </a:p>
+                  </a:txBody>
+                  <a:tcPr/>
+                </a:tc>
+                <a:tc>
+                  <a:txBody>
+                    <a:bodyPr/>
+                    <a:p>
+                      <a:pPr>
+                        <a:buNone/>
+                      </a:pPr>
+                      <a:r>
+                        <a:rPr lang="en-US" altLang="zh-CN" b="1"/>
+                        <a:t>DB00715,DB00843</a:t>
+                      </a:r>
+                      <a:endParaRPr lang="en-US" altLang="zh-CN" b="1"/>
+                    </a:p>
+                  </a:txBody>
+                  <a:tcPr/>
+                </a:tc>
+                <a:tc>
+                  <a:txBody>
+                    <a:bodyPr/>
+                    <a:p>
+                      <a:pPr algn="l">
+                        <a:buNone/>
+                      </a:pPr>
+                      <a:r>
+                        <a:rPr lang="en-US" altLang="zh-CN" b="1">
+                          <a:solidFill>
+                            <a:srgbClr val="C00000"/>
+                          </a:solidFill>
+                        </a:rPr>
+                        <a:t>Paroxetine</a:t>
+                      </a:r>
+                      <a:r>
+                        <a:rPr lang="en-US" altLang="zh-CN" b="1"/>
+                        <a:t>,</a:t>
+                      </a:r>
+                      <a:r>
+                        <a:rPr lang="en-US" altLang="zh-CN" b="1">
+                          <a:solidFill>
+                            <a:srgbClr val="00B050"/>
+                          </a:solidFill>
+                        </a:rPr>
+                        <a:t>Donepezil</a:t>
+                      </a:r>
+                      <a:endParaRPr lang="en-US" altLang="zh-CN" b="1">
+                        <a:solidFill>
+                          <a:srgbClr val="00B050"/>
+                        </a:solidFill>
+                      </a:endParaRPr>
+                    </a:p>
+                  </a:txBody>
+                  <a:tcPr/>
+                </a:tc>
+              </a:tr>
+              <a:tr h="457200">
+                <a:tc>
+                  <a:txBody>
+                    <a:bodyPr/>
+                    <a:p>
+                      <a:pPr>
+                        <a:buNone/>
+                      </a:pPr>
+                      <a:r>
+                        <a:rPr lang="en-US" altLang="zh-CN" b="1"/>
+                        <a:t>8</a:t>
+                      </a:r>
+                      <a:endParaRPr lang="en-US" altLang="zh-CN" b="1"/>
+                    </a:p>
+                  </a:txBody>
+                  <a:tcPr/>
+                </a:tc>
+                <a:tc>
+                  <a:txBody>
+                    <a:bodyPr/>
+                    <a:p>
+                      <a:pPr>
+                        <a:buNone/>
+                      </a:pPr>
+                      <a:r>
+                        <a:rPr lang="en-US" altLang="zh-CN" b="1"/>
+                        <a:t>DB01238,DB00726</a:t>
+                      </a:r>
+                      <a:endParaRPr lang="en-US" altLang="zh-CN" b="1"/>
+                    </a:p>
+                  </a:txBody>
+                  <a:tcPr/>
+                </a:tc>
+                <a:tc>
+                  <a:txBody>
+                    <a:bodyPr/>
+                    <a:p>
+                      <a:pPr algn="l">
+                        <a:buNone/>
+                      </a:pPr>
+                      <a:r>
+                        <a:rPr lang="en-US" altLang="zh-CN" sz="2400" b="1">
+                          <a:sym typeface="+mn-ea"/>
+                        </a:rPr>
+                        <a:t>Aripiprazole,Trimipramine</a:t>
+                      </a:r>
+                      <a:endParaRPr lang="en-US" altLang="zh-CN" sz="2400" b="1">
+                        <a:sym typeface="+mn-ea"/>
+                      </a:endParaRPr>
+                    </a:p>
+                  </a:txBody>
+                  <a:tcPr/>
+                </a:tc>
+              </a:tr>
+              <a:tr h="457200">
+                <a:tc>
+                  <a:txBody>
+                    <a:bodyPr/>
+                    <a:p>
+                      <a:pPr>
+                        <a:buNone/>
+                      </a:pPr>
+                      <a:r>
+                        <a:rPr lang="en-US" altLang="zh-CN">
+                          <a:solidFill>
+                            <a:schemeClr val="bg1">
+                              <a:lumMod val="50000"/>
+                              <a:lumOff val="50000"/>
+                            </a:schemeClr>
+                          </a:solidFill>
+                        </a:rPr>
+                        <a:t>9</a:t>
+                      </a:r>
+                      <a:endParaRPr lang="en-US" altLang="zh-CN">
+                        <a:solidFill>
+                          <a:schemeClr val="bg1">
+                            <a:lumMod val="50000"/>
+                            <a:lumOff val="50000"/>
+                          </a:schemeClr>
+                        </a:solidFill>
+                      </a:endParaRPr>
+                    </a:p>
+                  </a:txBody>
+                  <a:tcPr/>
+                </a:tc>
+                <a:tc>
+                  <a:txBody>
+                    <a:bodyPr/>
+                    <a:p>
+                      <a:pPr>
+                        <a:buNone/>
+                      </a:pPr>
+                      <a:r>
+                        <a:rPr lang="en-US" altLang="zh-CN">
+                          <a:solidFill>
+                            <a:schemeClr val="bg1">
+                              <a:lumMod val="50000"/>
+                              <a:lumOff val="50000"/>
+                            </a:schemeClr>
+                          </a:solidFill>
+                        </a:rPr>
+                        <a:t>DB00382,DB01239</a:t>
+                      </a:r>
+                      <a:endParaRPr lang="en-US" altLang="zh-CN">
+                        <a:solidFill>
+                          <a:schemeClr val="bg1">
+                            <a:lumMod val="50000"/>
+                            <a:lumOff val="50000"/>
+                          </a:schemeClr>
+                        </a:solidFill>
+                      </a:endParaRPr>
+                    </a:p>
+                  </a:txBody>
+                  <a:tcPr/>
+                </a:tc>
+                <a:tc>
+                  <a:txBody>
+                    <a:bodyPr/>
+                    <a:p>
+                      <a:pPr algn="l">
+                        <a:buNone/>
+                      </a:pPr>
+                      <a:r>
+                        <a:rPr lang="en-US" altLang="zh-CN" sz="2400">
+                          <a:solidFill>
+                            <a:schemeClr val="bg1">
+                              <a:lumMod val="50000"/>
+                              <a:lumOff val="50000"/>
+                            </a:schemeClr>
+                          </a:solidFill>
+                          <a:sym typeface="+mn-ea"/>
+                        </a:rPr>
+                        <a:t>Tacrine,Chlorprothixene</a:t>
+                      </a:r>
+                      <a:endParaRPr lang="en-US" altLang="zh-CN" sz="2400">
+                        <a:solidFill>
+                          <a:schemeClr val="bg1">
+                            <a:lumMod val="50000"/>
+                            <a:lumOff val="50000"/>
+                          </a:schemeClr>
+                        </a:solidFill>
+                        <a:sym typeface="+mn-ea"/>
+                      </a:endParaRPr>
+                    </a:p>
+                  </a:txBody>
+                  <a:tcPr/>
+                </a:tc>
+              </a:tr>
+              <a:tr h="457200">
+                <a:tc>
+                  <a:txBody>
+                    <a:bodyPr/>
+                    <a:p>
+                      <a:pPr>
+                        <a:buNone/>
+                      </a:pPr>
+                      <a:r>
+                        <a:rPr lang="en-US" altLang="zh-CN" b="1"/>
+                        <a:t>10</a:t>
+                      </a:r>
+                      <a:endParaRPr lang="en-US" altLang="zh-CN" b="1"/>
+                    </a:p>
+                  </a:txBody>
+                  <a:tcPr/>
+                </a:tc>
+                <a:tc>
+                  <a:txBody>
+                    <a:bodyPr/>
+                    <a:p>
+                      <a:pPr>
+                        <a:buNone/>
+                      </a:pPr>
+                      <a:r>
+                        <a:rPr lang="en-US" altLang="zh-CN" b="1"/>
+                        <a:t>DB00382,DB00420</a:t>
+                      </a:r>
+                      <a:endParaRPr lang="en-US" altLang="zh-CN" b="1"/>
+                    </a:p>
+                  </a:txBody>
+                  <a:tcPr/>
+                </a:tc>
+                <a:tc>
+                  <a:txBody>
+                    <a:bodyPr/>
+                    <a:p>
+                      <a:pPr algn="l">
+                        <a:buNone/>
+                      </a:pPr>
+                      <a:r>
+                        <a:rPr lang="en-US" altLang="zh-CN" b="1"/>
+                        <a:t>Tacrine,Promazine</a:t>
+                      </a:r>
+                      <a:endParaRPr lang="en-US" altLang="zh-CN" b="1"/>
+                    </a:p>
+                  </a:txBody>
+                  <a:tcPr/>
+                </a:tc>
+              </a:tr>
+            </a:tbl>
+          </a:graphicData>
+        </a:graphic>
+      </p:graphicFrame>
+    </p:spTree>
+  </p:cSld>
+  <p:clrMapOvr>
+    <a:masterClrMapping/>
+  </p:clrMapOvr>
+  <mc:AlternateContent xmlns:mc="http://schemas.openxmlformats.org/markup-compatibility/2006">
+    <mc:Choice xmlns:p15="http://schemas.microsoft.com/office/powerpoint/2012/main" Requires="p15">
+      <p:transition xmlns:p14="http://schemas.microsoft.com/office/powerpoint/2010/main" Requires="p14" p14:dur="500">
+        <p15:prstTrans prst="pageCurlDouble"/>
+      </p:transition>
+    </mc:Choice>
+    <mc:Fallback>
+      <p:transition>
+        <p:fade/>
+      </p:transition>
+    </mc:Fallback>
+  </mc:AlternateContent>
+  <p:timing>
+    <p:tnLst>
+      <p:par>
+        <p:cTn id="1" dur="indefinite" restart="never" fill="hold" nodeType="tmRoot">
+          <p:childTnLst>
+            <p:seq concurrent="1" nextAc="seek">
+              <p:cTn id="2" dur="indefinite" nodeType="mainSeq">
+                <p:childTnLst>
+                  <p:par>
+                    <p:cTn id="3" fill="hold">
+                      <p:stCondLst>
+                        <p:cond delay="indefinite"/>
+                      </p:stCondLst>
+                      <p:childTnLst>
+                        <p:par>
+                          <p:cTn id="4" fill="hold">
+                            <p:stCondLst>
+                              <p:cond delay="0"/>
+                            </p:stCondLst>
+                            <p:childTnLst>
+                              <p:par>
+                                <p:cTn id="5" presetID="2" presetClass="entr" presetSubtype="4" fill="hold" grpId="0" nodeType="clickEffect">
+                                  <p:stCondLst>
+                                    <p:cond delay="0"/>
+                                  </p:stCondLst>
+                                  <p:childTnLst>
+                                    <p:set>
+                                      <p:cBhvr>
+                                        <p:cTn id="6" dur="1" fill="hold">
+                                          <p:stCondLst>
+                                            <p:cond delay="0"/>
+                                          </p:stCondLst>
+                                        </p:cTn>
+                                        <p:tgtEl>
+                                          <p:spTgt spid="551"/>
+                                        </p:tgtEl>
+                                        <p:attrNameLst>
+                                          <p:attrName>style.visibility</p:attrName>
+                                        </p:attrNameLst>
+                                      </p:cBhvr>
+                                      <p:to>
+                                        <p:strVal val="visible"/>
+                                      </p:to>
+                                    </p:set>
+                                    <p:anim calcmode="lin" valueType="num">
+                                      <p:cBhvr additive="base">
+                                        <p:cTn id="7" dur="500" fill="hold"/>
+                                        <p:tgtEl>
+                                          <p:spTgt spid="551"/>
+                                        </p:tgtEl>
+                                        <p:attrNameLst>
+                                          <p:attrName>ppt_x</p:attrName>
+                                        </p:attrNameLst>
+                                      </p:cBhvr>
+                                      <p:tavLst>
+                                        <p:tav tm="0">
+                                          <p:val>
+                                            <p:strVal val="#ppt_x"/>
+                                          </p:val>
+                                        </p:tav>
+                                        <p:tav tm="100000">
+                                          <p:val>
+                                            <p:strVal val="#ppt_x"/>
+                                          </p:val>
+                                        </p:tav>
+                                      </p:tavLst>
+                                    </p:anim>
+                                    <p:anim calcmode="lin" valueType="num">
+                                      <p:cBhvr additive="base">
+                                        <p:cTn id="8" dur="500" fill="hold"/>
+                                        <p:tgtEl>
+                                          <p:spTgt spid="551"/>
+                                        </p:tgtEl>
+                                        <p:attrNameLst>
+                                          <p:attrName>ppt_y</p:attrName>
+                                        </p:attrNameLst>
+                                      </p:cBhvr>
+                                      <p:tavLst>
+                                        <p:tav tm="0">
+                                          <p:val>
+                                            <p:strVal val="1+#ppt_h/2"/>
+                                          </p:val>
+                                        </p:tav>
+                                        <p:tav tm="100000">
+                                          <p:val>
+                                            <p:strVal val="#ppt_y"/>
+                                          </p:val>
+                                        </p:tav>
+                                      </p:tavLst>
+                                    </p:anim>
+                                  </p:childTnLst>
+                                </p:cTn>
+                              </p:par>
+                              <p:par>
+                                <p:cTn id="9" presetID="2" presetClass="entr" presetSubtype="4" fill="hold" nodeType="withEffect">
+                                  <p:stCondLst>
+                                    <p:cond delay="0"/>
+                                  </p:stCondLst>
+                                  <p:childTnLst>
+                                    <p:set>
+                                      <p:cBhvr>
+                                        <p:cTn id="10" dur="1" fill="hold">
+                                          <p:stCondLst>
+                                            <p:cond delay="0"/>
+                                          </p:stCondLst>
+                                        </p:cTn>
+                                        <p:tgtEl>
+                                          <p:spTgt spid="495"/>
+                                        </p:tgtEl>
+                                        <p:attrNameLst>
+                                          <p:attrName>style.visibility</p:attrName>
+                                        </p:attrNameLst>
+                                      </p:cBhvr>
+                                      <p:to>
+                                        <p:strVal val="visible"/>
+                                      </p:to>
+                                    </p:set>
+                                    <p:anim calcmode="lin" valueType="num">
+                                      <p:cBhvr additive="base">
+                                        <p:cTn id="11" dur="500" fill="hold"/>
+                                        <p:tgtEl>
+                                          <p:spTgt spid="495"/>
+                                        </p:tgtEl>
+                                        <p:attrNameLst>
+                                          <p:attrName>ppt_x</p:attrName>
+                                        </p:attrNameLst>
+                                      </p:cBhvr>
+                                      <p:tavLst>
+                                        <p:tav tm="0">
+                                          <p:val>
+                                            <p:strVal val="#ppt_x"/>
+                                          </p:val>
+                                        </p:tav>
+                                        <p:tav tm="100000">
+                                          <p:val>
+                                            <p:strVal val="#ppt_x"/>
+                                          </p:val>
+                                        </p:tav>
+                                      </p:tavLst>
+                                    </p:anim>
+                                    <p:anim calcmode="lin" valueType="num">
+                                      <p:cBhvr additive="base">
+                                        <p:cTn id="12" dur="500" fill="hold"/>
+                                        <p:tgtEl>
+                                          <p:spTgt spid="495"/>
+                                        </p:tgtEl>
+                                        <p:attrNameLst>
+                                          <p:attrName>ppt_y</p:attrName>
+                                        </p:attrNameLst>
+                                      </p:cBhvr>
+                                      <p:tavLst>
+                                        <p:tav tm="0">
+                                          <p:val>
+                                            <p:strVal val="1+#ppt_h/2"/>
+                                          </p:val>
+                                        </p:tav>
+                                        <p:tav tm="100000">
+                                          <p:val>
+                                            <p:strVal val="#ppt_y"/>
+                                          </p:val>
+                                        </p:tav>
+                                      </p:tavLst>
+                                    </p:anim>
+                                  </p:childTnLst>
+                                </p:cTn>
+                              </p:par>
+                            </p:childTnLst>
+                          </p:cTn>
+                        </p:par>
+                      </p:childTnLst>
+                    </p:cTn>
+                  </p:par>
+                </p:childTnLst>
+              </p:cTn>
+              <p:prevCondLst>
+                <p:cond evt="onPrev" delay="0">
+                  <p:tgtEl>
+                    <p:sldTgt/>
+                  </p:tgtEl>
+                </p:cond>
+              </p:prevCondLst>
+              <p:nextCondLst>
+                <p:cond evt="onNext" delay="0">
+                  <p:tgtEl>
+                    <p:sldTgt/>
+                  </p:tgtEl>
+                </p:cond>
+              </p:nextCondLst>
+            </p:seq>
+          </p:childTnLst>
+        </p:cTn>
+      </p:par>
+    </p:tnLst>
+    <p:bldLst>
+      <p:bldP spid="551" grpId="0"/>
+    </p:bldLst>
+  </p:timing>
+</p:sld>
+</file>
+
+<file path=ppt/slides/slide11.xml><?xml version="1.0" encoding="utf-8"?>
+<p:sld xmlns:a="http://schemas.openxmlformats.org/drawingml/2006/main" xmlns:r="http://schemas.openxmlformats.org/officeDocument/2006/relationships" xmlns:p="http://schemas.openxmlformats.org/presentationml/2006/main">
+  <p:cSld>
+    <p:spTree>
+      <p:nvGrpSpPr>
+        <p:cNvPr id="1" name=""/>
+        <p:cNvGrpSpPr/>
+        <p:nvPr/>
+      </p:nvGrpSpPr>
+      <p:grpSpPr>
+        <a:xfrm>
+          <a:off x="0" y="0"/>
+          <a:ext cx="0" cy="0"/>
+          <a:chOff x="0" y="0"/>
+          <a:chExt cx="0" cy="0"/>
+        </a:xfrm>
+      </p:grpSpPr>
+      <p:sp>
+        <p:nvSpPr>
           <p:cNvPr id="43" name="Shape 43"/>
           <p:cNvSpPr/>
           <p:nvPr/>
@@ -2826,439 +4398,6 @@
           </a:p>
         </p:txBody>
       </p:sp>
-      <p:sp>
-        <p:nvSpPr>
-          <p:cNvPr id="44" name="Shape 44"/>
-          <p:cNvSpPr/>
-          <p:nvPr/>
-        </p:nvSpPr>
-        <p:spPr>
-          <a:xfrm>
-            <a:off x="10675027" y="7379958"/>
-            <a:ext cx="2133600" cy="593725"/>
-          </a:xfrm>
-          <a:prstGeom prst="rect">
-            <a:avLst/>
-          </a:prstGeom>
-          <a:ln w="12700">
-            <a:miter lim="400000"/>
-          </a:ln>
-        </p:spPr>
-        <p:txBody>
-          <a:bodyPr wrap="none" lIns="50800" tIns="50800" rIns="50800" bIns="50800" anchor="ctr">
-            <a:spAutoFit/>
-          </a:bodyPr>
-          <a:lstStyle>
-            <a:lvl1pPr>
-              <a:defRPr sz="3000" b="1">
-                <a:solidFill>
-                  <a:srgbClr val="4F5761"/>
-                </a:solidFill>
-                <a:latin typeface="Lato"/>
-                <a:ea typeface="Lato"/>
-                <a:cs typeface="Lato"/>
-                <a:sym typeface="Lato"/>
-              </a:defRPr>
-            </a:lvl1pPr>
-          </a:lstStyle>
-          <a:p>
-            <a:pPr lvl="0">
-              <a:defRPr sz="1800" b="0">
-                <a:solidFill>
-                  <a:srgbClr val="000000"/>
-                </a:solidFill>
-              </a:defRPr>
-            </a:pPr>
-            <a:r>
-              <a:rPr lang="zh-CN" altLang="en-US" sz="3200" dirty="0">
-                <a:latin typeface="+mn-lt"/>
-                <a:ea typeface="+mn-ea"/>
-                <a:cs typeface="+mn-ea"/>
-                <a:sym typeface="+mn-lt"/>
-              </a:rPr>
-              <a:t>感谢观赏！</a:t>
-            </a:r>
-            <a:endParaRPr lang="zh-CN" altLang="en-US" sz="3200" dirty="0">
-              <a:latin typeface="+mn-lt"/>
-              <a:ea typeface="+mn-ea"/>
-              <a:cs typeface="+mn-ea"/>
-              <a:sym typeface="+mn-lt"/>
-            </a:endParaRPr>
-          </a:p>
-        </p:txBody>
-      </p:sp>
-      <p:grpSp>
-        <p:nvGrpSpPr>
-          <p:cNvPr id="48" name="Group 48"/>
-          <p:cNvGrpSpPr/>
-          <p:nvPr/>
-        </p:nvGrpSpPr>
-        <p:grpSpPr>
-          <a:xfrm>
-            <a:off x="1838728" y="12974578"/>
-            <a:ext cx="482601" cy="482601"/>
-            <a:chOff x="0" y="0"/>
-            <a:chExt cx="482600" cy="482600"/>
-          </a:xfrm>
-        </p:grpSpPr>
-        <p:sp>
-          <p:nvSpPr>
-            <p:cNvPr id="46" name="Shape 46"/>
-            <p:cNvSpPr/>
-            <p:nvPr/>
-          </p:nvSpPr>
-          <p:spPr>
-            <a:xfrm>
-              <a:off x="0" y="0"/>
-              <a:ext cx="482600" cy="482600"/>
-            </a:xfrm>
-            <a:prstGeom prst="rect">
-              <a:avLst/>
-            </a:prstGeom>
-            <a:solidFill>
-              <a:srgbClr val="4F5761"/>
-            </a:solidFill>
-            <a:ln w="12700" cap="flat">
-              <a:noFill/>
-              <a:miter lim="400000"/>
-            </a:ln>
-            <a:effectLst/>
-          </p:spPr>
-          <p:txBody>
-            <a:bodyPr wrap="square" lIns="0" tIns="0" rIns="0" bIns="0" numCol="1" anchor="ctr">
-              <a:noAutofit/>
-            </a:bodyPr>
-            <a:lstStyle/>
-            <a:p>
-              <a:pPr lvl="0">
-                <a:defRPr sz="3600"/>
-              </a:pPr>
-              <a:endParaRPr>
-                <a:cs typeface="+mn-ea"/>
-                <a:sym typeface="+mn-lt"/>
-              </a:endParaRPr>
-            </a:p>
-          </p:txBody>
-        </p:sp>
-        <p:sp>
-          <p:nvSpPr>
-            <p:cNvPr id="47" name="Shape 47"/>
-            <p:cNvSpPr/>
-            <p:nvPr/>
-          </p:nvSpPr>
-          <p:spPr>
-            <a:xfrm>
-              <a:off x="94596" y="28058"/>
-              <a:ext cx="293408" cy="426484"/>
-            </a:xfrm>
-            <a:prstGeom prst="rect">
-              <a:avLst/>
-            </a:prstGeom>
-            <a:noFill/>
-            <a:ln w="12700" cap="flat">
-              <a:noFill/>
-              <a:miter lim="400000"/>
-            </a:ln>
-            <a:effectLst/>
-          </p:spPr>
-          <p:txBody>
-            <a:bodyPr wrap="square" lIns="0" tIns="0" rIns="0" bIns="0" numCol="1" anchor="ctr">
-              <a:noAutofit/>
-            </a:bodyPr>
-            <a:lstStyle>
-              <a:lvl1pPr>
-                <a:defRPr sz="2400">
-                  <a:solidFill>
-                    <a:srgbClr val="E5E5E8"/>
-                  </a:solidFill>
-                  <a:latin typeface="FontAwesome"/>
-                  <a:ea typeface="FontAwesome"/>
-                  <a:cs typeface="FontAwesome"/>
-                  <a:sym typeface="FontAwesome"/>
-                </a:defRPr>
-              </a:lvl1pPr>
-            </a:lstStyle>
-            <a:p>
-              <a:pPr lvl="0">
-                <a:defRPr sz="1800">
-                  <a:solidFill>
-                    <a:srgbClr val="000000"/>
-                  </a:solidFill>
-                </a:defRPr>
-              </a:pPr>
-              <a:r>
-                <a:rPr sz="2400">
-                  <a:solidFill>
-                    <a:srgbClr val="E5E5E8"/>
-                  </a:solidFill>
-                  <a:latin typeface="+mn-lt"/>
-                  <a:ea typeface="+mn-ea"/>
-                  <a:cs typeface="+mn-ea"/>
-                  <a:sym typeface="+mn-lt"/>
-                </a:rPr>
-                <a:t></a:t>
-              </a:r>
-              <a:endParaRPr sz="2400">
-                <a:solidFill>
-                  <a:srgbClr val="E5E5E8"/>
-                </a:solidFill>
-                <a:latin typeface="+mn-lt"/>
-                <a:ea typeface="+mn-ea"/>
-                <a:cs typeface="+mn-ea"/>
-                <a:sym typeface="+mn-lt"/>
-              </a:endParaRPr>
-            </a:p>
-          </p:txBody>
-        </p:sp>
-      </p:grpSp>
-      <p:grpSp>
-        <p:nvGrpSpPr>
-          <p:cNvPr id="51" name="Group 51"/>
-          <p:cNvGrpSpPr/>
-          <p:nvPr/>
-        </p:nvGrpSpPr>
-        <p:grpSpPr>
-          <a:xfrm>
-            <a:off x="2912435" y="12974578"/>
-            <a:ext cx="482601" cy="482601"/>
-            <a:chOff x="0" y="0"/>
-            <a:chExt cx="482600" cy="482600"/>
-          </a:xfrm>
-        </p:grpSpPr>
-        <p:sp>
-          <p:nvSpPr>
-            <p:cNvPr id="49" name="Shape 49"/>
-            <p:cNvSpPr/>
-            <p:nvPr/>
-          </p:nvSpPr>
-          <p:spPr>
-            <a:xfrm>
-              <a:off x="0" y="0"/>
-              <a:ext cx="482600" cy="482600"/>
-            </a:xfrm>
-            <a:prstGeom prst="rect">
-              <a:avLst/>
-            </a:prstGeom>
-            <a:solidFill>
-              <a:srgbClr val="4F5761"/>
-            </a:solidFill>
-            <a:ln w="12700" cap="flat">
-              <a:noFill/>
-              <a:miter lim="400000"/>
-            </a:ln>
-            <a:effectLst/>
-          </p:spPr>
-          <p:txBody>
-            <a:bodyPr wrap="square" lIns="0" tIns="0" rIns="0" bIns="0" numCol="1" anchor="ctr">
-              <a:noAutofit/>
-            </a:bodyPr>
-            <a:lstStyle/>
-            <a:p>
-              <a:pPr lvl="0">
-                <a:defRPr sz="3600"/>
-              </a:pPr>
-              <a:endParaRPr>
-                <a:cs typeface="+mn-ea"/>
-                <a:sym typeface="+mn-lt"/>
-              </a:endParaRPr>
-            </a:p>
-          </p:txBody>
-        </p:sp>
-        <p:sp>
-          <p:nvSpPr>
-            <p:cNvPr id="50" name="Shape 50"/>
-            <p:cNvSpPr/>
-            <p:nvPr/>
-          </p:nvSpPr>
-          <p:spPr>
-            <a:xfrm>
-              <a:off x="75356" y="61727"/>
-              <a:ext cx="331888" cy="359146"/>
-            </a:xfrm>
-            <a:prstGeom prst="rect">
-              <a:avLst/>
-            </a:prstGeom>
-            <a:noFill/>
-            <a:ln w="12700" cap="flat">
-              <a:noFill/>
-              <a:miter lim="400000"/>
-            </a:ln>
-            <a:effectLst/>
-          </p:spPr>
-          <p:txBody>
-            <a:bodyPr wrap="square" lIns="0" tIns="0" rIns="0" bIns="0" numCol="1" anchor="ctr">
-              <a:noAutofit/>
-            </a:bodyPr>
-            <a:lstStyle>
-              <a:lvl1pPr>
-                <a:defRPr sz="2400">
-                  <a:solidFill>
-                    <a:srgbClr val="E6E4E8"/>
-                  </a:solidFill>
-                  <a:latin typeface="FontAwesome"/>
-                  <a:ea typeface="FontAwesome"/>
-                  <a:cs typeface="FontAwesome"/>
-                  <a:sym typeface="FontAwesome"/>
-                </a:defRPr>
-              </a:lvl1pPr>
-            </a:lstStyle>
-            <a:p>
-              <a:pPr lvl="0">
-                <a:defRPr sz="1800">
-                  <a:solidFill>
-                    <a:srgbClr val="000000"/>
-                  </a:solidFill>
-                </a:defRPr>
-              </a:pPr>
-              <a:r>
-                <a:rPr sz="2400">
-                  <a:solidFill>
-                    <a:srgbClr val="E6E4E8"/>
-                  </a:solidFill>
-                  <a:latin typeface="+mn-lt"/>
-                  <a:ea typeface="+mn-ea"/>
-                  <a:cs typeface="+mn-ea"/>
-                  <a:sym typeface="+mn-lt"/>
-                </a:rPr>
-                <a:t></a:t>
-              </a:r>
-              <a:endParaRPr sz="2400">
-                <a:solidFill>
-                  <a:srgbClr val="E6E4E8"/>
-                </a:solidFill>
-                <a:latin typeface="+mn-lt"/>
-                <a:ea typeface="+mn-ea"/>
-                <a:cs typeface="+mn-ea"/>
-                <a:sym typeface="+mn-lt"/>
-              </a:endParaRPr>
-            </a:p>
-          </p:txBody>
-        </p:sp>
-      </p:grpSp>
-      <p:grpSp>
-        <p:nvGrpSpPr>
-          <p:cNvPr id="54" name="Group 54"/>
-          <p:cNvGrpSpPr/>
-          <p:nvPr/>
-        </p:nvGrpSpPr>
-        <p:grpSpPr>
-          <a:xfrm>
-            <a:off x="765021" y="12946126"/>
-            <a:ext cx="482601" cy="482601"/>
-            <a:chOff x="0" y="0"/>
-            <a:chExt cx="482600" cy="482600"/>
-          </a:xfrm>
-        </p:grpSpPr>
-        <p:sp>
-          <p:nvSpPr>
-            <p:cNvPr id="52" name="Shape 52"/>
-            <p:cNvSpPr/>
-            <p:nvPr/>
-          </p:nvSpPr>
-          <p:spPr>
-            <a:xfrm>
-              <a:off x="0" y="0"/>
-              <a:ext cx="482600" cy="482600"/>
-            </a:xfrm>
-            <a:prstGeom prst="rect">
-              <a:avLst/>
-            </a:prstGeom>
-            <a:solidFill>
-              <a:srgbClr val="4F5761"/>
-            </a:solidFill>
-            <a:ln w="12700" cap="flat">
-              <a:noFill/>
-              <a:miter lim="400000"/>
-            </a:ln>
-            <a:effectLst/>
-          </p:spPr>
-          <p:txBody>
-            <a:bodyPr wrap="square" lIns="0" tIns="0" rIns="0" bIns="0" numCol="1" anchor="ctr">
-              <a:noAutofit/>
-            </a:bodyPr>
-            <a:lstStyle/>
-            <a:p>
-              <a:pPr lvl="0">
-                <a:defRPr sz="3600"/>
-              </a:pPr>
-              <a:endParaRPr>
-                <a:cs typeface="+mn-ea"/>
-                <a:sym typeface="+mn-lt"/>
-              </a:endParaRPr>
-            </a:p>
-          </p:txBody>
-        </p:sp>
-        <p:sp>
-          <p:nvSpPr>
-            <p:cNvPr id="53" name="Shape 53"/>
-            <p:cNvSpPr/>
-            <p:nvPr/>
-          </p:nvSpPr>
-          <p:spPr>
-            <a:xfrm>
-              <a:off x="60525" y="56116"/>
-              <a:ext cx="361550" cy="370368"/>
-            </a:xfrm>
-            <a:prstGeom prst="rect">
-              <a:avLst/>
-            </a:prstGeom>
-            <a:noFill/>
-            <a:ln w="12700" cap="flat">
-              <a:noFill/>
-              <a:miter lim="400000"/>
-            </a:ln>
-            <a:effectLst/>
-          </p:spPr>
-          <p:txBody>
-            <a:bodyPr wrap="square" lIns="0" tIns="0" rIns="0" bIns="0" numCol="1" anchor="ctr">
-              <a:noAutofit/>
-            </a:bodyPr>
-            <a:lstStyle>
-              <a:lvl1pPr>
-                <a:defRPr sz="2500">
-                  <a:solidFill>
-                    <a:srgbClr val="E6E4E8"/>
-                  </a:solidFill>
-                  <a:latin typeface="FontAwesome"/>
-                  <a:ea typeface="FontAwesome"/>
-                  <a:cs typeface="FontAwesome"/>
-                  <a:sym typeface="FontAwesome"/>
-                </a:defRPr>
-              </a:lvl1pPr>
-            </a:lstStyle>
-            <a:p>
-              <a:pPr lvl="0">
-                <a:defRPr sz="1800">
-                  <a:solidFill>
-                    <a:srgbClr val="000000"/>
-                  </a:solidFill>
-                </a:defRPr>
-              </a:pPr>
-              <a:r>
-                <a:rPr sz="2500">
-                  <a:solidFill>
-                    <a:srgbClr val="E6E4E8"/>
-                  </a:solidFill>
-                  <a:latin typeface="+mn-lt"/>
-                  <a:ea typeface="+mn-ea"/>
-                  <a:cs typeface="+mn-ea"/>
-                  <a:sym typeface="+mn-lt"/>
-                </a:rPr>
-                <a:t></a:t>
-              </a:r>
-              <a:endParaRPr sz="2500">
-                <a:solidFill>
-                  <a:srgbClr val="E6E4E8"/>
-                </a:solidFill>
-                <a:latin typeface="+mn-lt"/>
-                <a:ea typeface="+mn-ea"/>
-                <a:cs typeface="+mn-ea"/>
-                <a:sym typeface="+mn-lt"/>
-              </a:endParaRPr>
-            </a:p>
-          </p:txBody>
-        </p:sp>
-      </p:grpSp>
       <p:sp>
         <p:nvSpPr>
           <p:cNvPr id="55" name="Shape 55"/>
@@ -3354,6 +4493,927 @@
 </file>
 
 <file path=ppt/slides/slide2.xml><?xml version="1.0" encoding="utf-8"?>
+<p:sld xmlns:a="http://schemas.openxmlformats.org/drawingml/2006/main" xmlns:r="http://schemas.openxmlformats.org/officeDocument/2006/relationships" xmlns:p="http://schemas.openxmlformats.org/presentationml/2006/main">
+  <p:cSld>
+    <p:spTree>
+      <p:nvGrpSpPr>
+        <p:cNvPr id="1" name=""/>
+        <p:cNvGrpSpPr/>
+        <p:nvPr/>
+      </p:nvGrpSpPr>
+      <p:grpSpPr/>
+      <p:sp>
+        <p:nvSpPr>
+          <p:cNvPr id="58" name="Shape 58"/>
+          <p:cNvSpPr/>
+          <p:nvPr/>
+        </p:nvSpPr>
+        <p:spPr>
+          <a:xfrm>
+            <a:off x="3038474" y="4524462"/>
+            <a:ext cx="4667250" cy="4746625"/>
+          </a:xfrm>
+          <a:custGeom>
+            <a:avLst/>
+            <a:gdLst/>
+            <a:ahLst/>
+            <a:cxnLst>
+              <a:cxn ang="0">
+                <a:pos x="wd2" y="hd2"/>
+              </a:cxn>
+              <a:cxn ang="5400000">
+                <a:pos x="wd2" y="hd2"/>
+              </a:cxn>
+              <a:cxn ang="10800000">
+                <a:pos x="wd2" y="hd2"/>
+              </a:cxn>
+              <a:cxn ang="16200000">
+                <a:pos x="wd2" y="hd2"/>
+              </a:cxn>
+            </a:cxnLst>
+            <a:rect l="0" t="0" r="r" b="b"/>
+            <a:pathLst>
+              <a:path w="19679" h="19679" extrusionOk="0">
+                <a:moveTo>
+                  <a:pt x="16796" y="2882"/>
+                </a:moveTo>
+                <a:cubicBezTo>
+                  <a:pt x="20639" y="6724"/>
+                  <a:pt x="20639" y="12954"/>
+                  <a:pt x="16796" y="16796"/>
+                </a:cubicBezTo>
+                <a:cubicBezTo>
+                  <a:pt x="12954" y="20639"/>
+                  <a:pt x="6724" y="20639"/>
+                  <a:pt x="2882" y="16796"/>
+                </a:cubicBezTo>
+                <a:cubicBezTo>
+                  <a:pt x="-961" y="12954"/>
+                  <a:pt x="-961" y="6724"/>
+                  <a:pt x="2882" y="2882"/>
+                </a:cubicBezTo>
+                <a:cubicBezTo>
+                  <a:pt x="6724" y="-961"/>
+                  <a:pt x="12954" y="-961"/>
+                  <a:pt x="16796" y="2882"/>
+                </a:cubicBezTo>
+                <a:close/>
+              </a:path>
+            </a:pathLst>
+          </a:custGeom>
+          <a:gradFill>
+            <a:gsLst>
+              <a:gs pos="26200">
+                <a:srgbClr val="69686A"/>
+              </a:gs>
+              <a:gs pos="48394">
+                <a:srgbClr val="6F1F35"/>
+              </a:gs>
+              <a:gs pos="67832">
+                <a:srgbClr val="727F8D"/>
+              </a:gs>
+              <a:gs pos="100000">
+                <a:srgbClr val="A3B5CA"/>
+              </a:gs>
+            </a:gsLst>
+          </a:gradFill>
+          <a:ln w="12700">
+            <a:miter lim="400000"/>
+          </a:ln>
+        </p:spPr>
+        <p:txBody>
+          <a:bodyPr lIns="0" tIns="0" rIns="0" bIns="0" anchor="ctr"/>
+          <a:lstStyle/>
+          <a:p>
+            <a:pPr lvl="0">
+              <a:defRPr sz="3600"/>
+            </a:pPr>
+            <a:endParaRPr>
+              <a:cs typeface="+mn-ea"/>
+              <a:sym typeface="+mn-lt"/>
+            </a:endParaRPr>
+          </a:p>
+        </p:txBody>
+      </p:sp>
+      <p:sp>
+        <p:nvSpPr>
+          <p:cNvPr id="59" name="Shape 59"/>
+          <p:cNvSpPr/>
+          <p:nvPr/>
+        </p:nvSpPr>
+        <p:spPr>
+          <a:xfrm>
+            <a:off x="3265068" y="4790743"/>
+            <a:ext cx="4214062" cy="4214062"/>
+          </a:xfrm>
+          <a:custGeom>
+            <a:avLst/>
+            <a:gdLst/>
+            <a:ahLst/>
+            <a:cxnLst>
+              <a:cxn ang="0">
+                <a:pos x="wd2" y="hd2"/>
+              </a:cxn>
+              <a:cxn ang="5400000">
+                <a:pos x="wd2" y="hd2"/>
+              </a:cxn>
+              <a:cxn ang="10800000">
+                <a:pos x="wd2" y="hd2"/>
+              </a:cxn>
+              <a:cxn ang="16200000">
+                <a:pos x="wd2" y="hd2"/>
+              </a:cxn>
+            </a:cxnLst>
+            <a:rect l="0" t="0" r="r" b="b"/>
+            <a:pathLst>
+              <a:path w="19679" h="19679" extrusionOk="0">
+                <a:moveTo>
+                  <a:pt x="16796" y="2882"/>
+                </a:moveTo>
+                <a:cubicBezTo>
+                  <a:pt x="20639" y="6724"/>
+                  <a:pt x="20639" y="12954"/>
+                  <a:pt x="16796" y="16796"/>
+                </a:cubicBezTo>
+                <a:cubicBezTo>
+                  <a:pt x="12954" y="20639"/>
+                  <a:pt x="6724" y="20639"/>
+                  <a:pt x="2882" y="16796"/>
+                </a:cubicBezTo>
+                <a:cubicBezTo>
+                  <a:pt x="-961" y="12954"/>
+                  <a:pt x="-961" y="6724"/>
+                  <a:pt x="2882" y="2882"/>
+                </a:cubicBezTo>
+                <a:cubicBezTo>
+                  <a:pt x="6724" y="-961"/>
+                  <a:pt x="12954" y="-961"/>
+                  <a:pt x="16796" y="2882"/>
+                </a:cubicBezTo>
+                <a:close/>
+              </a:path>
+            </a:pathLst>
+          </a:custGeom>
+          <a:solidFill>
+            <a:srgbClr val="E6E4E8"/>
+          </a:solidFill>
+          <a:ln w="12700">
+            <a:miter lim="400000"/>
+          </a:ln>
+        </p:spPr>
+        <p:txBody>
+          <a:bodyPr lIns="0" tIns="0" rIns="0" bIns="0" anchor="ctr"/>
+          <a:lstStyle/>
+          <a:p>
+            <a:pPr lvl="0">
+              <a:defRPr sz="3600"/>
+            </a:pPr>
+            <a:endParaRPr>
+              <a:cs typeface="+mn-ea"/>
+              <a:sym typeface="+mn-lt"/>
+            </a:endParaRPr>
+          </a:p>
+        </p:txBody>
+      </p:sp>
+      <p:sp>
+        <p:nvSpPr>
+          <p:cNvPr id="60" name="Shape 60"/>
+          <p:cNvSpPr/>
+          <p:nvPr/>
+        </p:nvSpPr>
+        <p:spPr>
+          <a:xfrm>
+            <a:off x="3378171" y="6539317"/>
+            <a:ext cx="3987857" cy="716915"/>
+          </a:xfrm>
+          <a:prstGeom prst="rect">
+            <a:avLst/>
+          </a:prstGeom>
+          <a:ln w="12700">
+            <a:miter lim="400000"/>
+          </a:ln>
+        </p:spPr>
+        <p:txBody>
+          <a:bodyPr lIns="50800" tIns="50800" rIns="50800" bIns="50800" anchor="ctr">
+            <a:spAutoFit/>
+          </a:bodyPr>
+          <a:lstStyle/>
+          <a:p>
+            <a:pPr lvl="0">
+              <a:defRPr sz="1800">
+                <a:solidFill>
+                  <a:srgbClr val="000000"/>
+                </a:solidFill>
+              </a:defRPr>
+            </a:pPr>
+            <a:r>
+              <a:rPr lang="zh-CN" altLang="en-US" sz="4000" dirty="0">
+                <a:solidFill>
+                  <a:schemeClr val="bg1">
+                    <a:lumMod val="65000"/>
+                    <a:lumOff val="35000"/>
+                  </a:schemeClr>
+                </a:solidFill>
+                <a:cs typeface="+mn-ea"/>
+                <a:sym typeface="+mn-lt"/>
+              </a:rPr>
+              <a:t>第一章 绪论</a:t>
+            </a:r>
+            <a:endParaRPr lang="zh-CN" altLang="en-US" sz="4000" dirty="0">
+              <a:solidFill>
+                <a:schemeClr val="bg1">
+                  <a:lumMod val="65000"/>
+                  <a:lumOff val="35000"/>
+                </a:schemeClr>
+              </a:solidFill>
+              <a:cs typeface="+mn-ea"/>
+              <a:sym typeface="+mn-lt"/>
+            </a:endParaRPr>
+          </a:p>
+        </p:txBody>
+      </p:sp>
+      <p:sp>
+        <p:nvSpPr>
+          <p:cNvPr id="62" name="Shape 62"/>
+          <p:cNvSpPr/>
+          <p:nvPr/>
+        </p:nvSpPr>
+        <p:spPr>
+          <a:xfrm>
+            <a:off x="5038675" y="6497665"/>
+            <a:ext cx="666849" cy="800219"/>
+          </a:xfrm>
+          <a:prstGeom prst="rect">
+            <a:avLst/>
+          </a:prstGeom>
+          <a:ln w="12700">
+            <a:miter lim="400000"/>
+          </a:ln>
+        </p:spPr>
+        <p:txBody>
+          <a:bodyPr wrap="none" lIns="0" tIns="0" rIns="0" bIns="0" anchor="ctr">
+            <a:spAutoFit/>
+          </a:bodyPr>
+          <a:lstStyle>
+            <a:lvl1pPr>
+              <a:defRPr sz="5200">
+                <a:solidFill>
+                  <a:srgbClr val="4F5761"/>
+                </a:solidFill>
+                <a:latin typeface="FontAwesome"/>
+                <a:ea typeface="FontAwesome"/>
+                <a:cs typeface="FontAwesome"/>
+                <a:sym typeface="FontAwesome"/>
+              </a:defRPr>
+            </a:lvl1pPr>
+          </a:lstStyle>
+          <a:p>
+            <a:pPr lvl="0">
+              <a:defRPr sz="1800">
+                <a:solidFill>
+                  <a:srgbClr val="000000"/>
+                </a:solidFill>
+              </a:defRPr>
+            </a:pPr>
+            <a:r>
+              <a:rPr sz="5200">
+                <a:solidFill>
+                  <a:srgbClr val="4F5761"/>
+                </a:solidFill>
+                <a:latin typeface="+mn-lt"/>
+                <a:ea typeface="+mn-ea"/>
+                <a:cs typeface="+mn-ea"/>
+                <a:sym typeface="+mn-lt"/>
+              </a:rPr>
+              <a:t></a:t>
+            </a:r>
+            <a:endParaRPr sz="5200">
+              <a:solidFill>
+                <a:srgbClr val="4F5761"/>
+              </a:solidFill>
+              <a:latin typeface="+mn-lt"/>
+              <a:ea typeface="+mn-ea"/>
+              <a:cs typeface="+mn-ea"/>
+              <a:sym typeface="+mn-lt"/>
+            </a:endParaRPr>
+          </a:p>
+        </p:txBody>
+      </p:sp>
+      <p:sp>
+        <p:nvSpPr>
+          <p:cNvPr id="2" name="Shape 58"/>
+          <p:cNvSpPr/>
+          <p:nvPr/>
+        </p:nvSpPr>
+        <p:spPr>
+          <a:xfrm>
+            <a:off x="10069195" y="4524462"/>
+            <a:ext cx="4667250" cy="4746625"/>
+          </a:xfrm>
+          <a:custGeom>
+            <a:avLst/>
+            <a:gdLst/>
+            <a:ahLst/>
+            <a:cxnLst>
+              <a:cxn ang="0">
+                <a:pos x="wd2" y="hd2"/>
+              </a:cxn>
+              <a:cxn ang="5400000">
+                <a:pos x="wd2" y="hd2"/>
+              </a:cxn>
+              <a:cxn ang="10800000">
+                <a:pos x="wd2" y="hd2"/>
+              </a:cxn>
+              <a:cxn ang="16200000">
+                <a:pos x="wd2" y="hd2"/>
+              </a:cxn>
+            </a:cxnLst>
+            <a:rect l="0" t="0" r="r" b="b"/>
+            <a:pathLst>
+              <a:path w="19679" h="19679" extrusionOk="0">
+                <a:moveTo>
+                  <a:pt x="16796" y="2882"/>
+                </a:moveTo>
+                <a:cubicBezTo>
+                  <a:pt x="20639" y="6724"/>
+                  <a:pt x="20639" y="12954"/>
+                  <a:pt x="16796" y="16796"/>
+                </a:cubicBezTo>
+                <a:cubicBezTo>
+                  <a:pt x="12954" y="20639"/>
+                  <a:pt x="6724" y="20639"/>
+                  <a:pt x="2882" y="16796"/>
+                </a:cubicBezTo>
+                <a:cubicBezTo>
+                  <a:pt x="-961" y="12954"/>
+                  <a:pt x="-961" y="6724"/>
+                  <a:pt x="2882" y="2882"/>
+                </a:cubicBezTo>
+                <a:cubicBezTo>
+                  <a:pt x="6724" y="-961"/>
+                  <a:pt x="12954" y="-961"/>
+                  <a:pt x="16796" y="2882"/>
+                </a:cubicBezTo>
+                <a:close/>
+              </a:path>
+            </a:pathLst>
+          </a:custGeom>
+          <a:gradFill>
+            <a:gsLst>
+              <a:gs pos="26200">
+                <a:srgbClr val="69686A"/>
+              </a:gs>
+              <a:gs pos="48394">
+                <a:srgbClr val="6F1F35"/>
+              </a:gs>
+              <a:gs pos="67832">
+                <a:srgbClr val="727F8D"/>
+              </a:gs>
+              <a:gs pos="100000">
+                <a:srgbClr val="A3B5CA"/>
+              </a:gs>
+            </a:gsLst>
+          </a:gradFill>
+          <a:ln w="12700">
+            <a:miter lim="400000"/>
+          </a:ln>
+        </p:spPr>
+        <p:txBody>
+          <a:bodyPr lIns="0" tIns="0" rIns="0" bIns="0" anchor="ctr"/>
+          <a:lstStyle/>
+          <a:p>
+            <a:pPr lvl="0">
+              <a:defRPr sz="3600"/>
+            </a:pPr>
+            <a:endParaRPr>
+              <a:cs typeface="+mn-ea"/>
+              <a:sym typeface="+mn-lt"/>
+            </a:endParaRPr>
+          </a:p>
+        </p:txBody>
+      </p:sp>
+      <p:sp>
+        <p:nvSpPr>
+          <p:cNvPr id="3" name="Shape 59"/>
+          <p:cNvSpPr/>
+          <p:nvPr/>
+        </p:nvSpPr>
+        <p:spPr>
+          <a:xfrm>
+            <a:off x="10295789" y="4790743"/>
+            <a:ext cx="4214062" cy="4214062"/>
+          </a:xfrm>
+          <a:custGeom>
+            <a:avLst/>
+            <a:gdLst/>
+            <a:ahLst/>
+            <a:cxnLst>
+              <a:cxn ang="0">
+                <a:pos x="wd2" y="hd2"/>
+              </a:cxn>
+              <a:cxn ang="5400000">
+                <a:pos x="wd2" y="hd2"/>
+              </a:cxn>
+              <a:cxn ang="10800000">
+                <a:pos x="wd2" y="hd2"/>
+              </a:cxn>
+              <a:cxn ang="16200000">
+                <a:pos x="wd2" y="hd2"/>
+              </a:cxn>
+            </a:cxnLst>
+            <a:rect l="0" t="0" r="r" b="b"/>
+            <a:pathLst>
+              <a:path w="19679" h="19679" extrusionOk="0">
+                <a:moveTo>
+                  <a:pt x="16796" y="2882"/>
+                </a:moveTo>
+                <a:cubicBezTo>
+                  <a:pt x="20639" y="6724"/>
+                  <a:pt x="20639" y="12954"/>
+                  <a:pt x="16796" y="16796"/>
+                </a:cubicBezTo>
+                <a:cubicBezTo>
+                  <a:pt x="12954" y="20639"/>
+                  <a:pt x="6724" y="20639"/>
+                  <a:pt x="2882" y="16796"/>
+                </a:cubicBezTo>
+                <a:cubicBezTo>
+                  <a:pt x="-961" y="12954"/>
+                  <a:pt x="-961" y="6724"/>
+                  <a:pt x="2882" y="2882"/>
+                </a:cubicBezTo>
+                <a:cubicBezTo>
+                  <a:pt x="6724" y="-961"/>
+                  <a:pt x="12954" y="-961"/>
+                  <a:pt x="16796" y="2882"/>
+                </a:cubicBezTo>
+                <a:close/>
+              </a:path>
+            </a:pathLst>
+          </a:custGeom>
+          <a:solidFill>
+            <a:srgbClr val="E6E4E8"/>
+          </a:solidFill>
+          <a:ln w="12700">
+            <a:miter lim="400000"/>
+          </a:ln>
+        </p:spPr>
+        <p:txBody>
+          <a:bodyPr lIns="0" tIns="0" rIns="0" bIns="0" anchor="ctr"/>
+          <a:lstStyle/>
+          <a:p>
+            <a:pPr lvl="0">
+              <a:defRPr sz="3600"/>
+            </a:pPr>
+            <a:endParaRPr>
+              <a:cs typeface="+mn-ea"/>
+              <a:sym typeface="+mn-lt"/>
+            </a:endParaRPr>
+          </a:p>
+        </p:txBody>
+      </p:sp>
+      <p:sp>
+        <p:nvSpPr>
+          <p:cNvPr id="4" name="Shape 60"/>
+          <p:cNvSpPr/>
+          <p:nvPr/>
+        </p:nvSpPr>
+        <p:spPr>
+          <a:xfrm>
+            <a:off x="10408891" y="6539317"/>
+            <a:ext cx="3987857" cy="716915"/>
+          </a:xfrm>
+          <a:prstGeom prst="rect">
+            <a:avLst/>
+          </a:prstGeom>
+          <a:ln w="12700">
+            <a:miter lim="400000"/>
+          </a:ln>
+        </p:spPr>
+        <p:txBody>
+          <a:bodyPr lIns="50800" tIns="50800" rIns="50800" bIns="50800" anchor="ctr">
+            <a:spAutoFit/>
+          </a:bodyPr>
+          <a:lstStyle/>
+          <a:p>
+            <a:pPr lvl="0">
+              <a:defRPr sz="1800">
+                <a:solidFill>
+                  <a:srgbClr val="000000"/>
+                </a:solidFill>
+              </a:defRPr>
+            </a:pPr>
+            <a:r>
+              <a:rPr lang="zh-CN" altLang="en-US" sz="4000" dirty="0">
+                <a:solidFill>
+                  <a:schemeClr val="bg1">
+                    <a:lumMod val="65000"/>
+                    <a:lumOff val="35000"/>
+                  </a:schemeClr>
+                </a:solidFill>
+                <a:cs typeface="+mn-ea"/>
+                <a:sym typeface="+mn-lt"/>
+              </a:rPr>
+              <a:t>第二章 算法介绍</a:t>
+            </a:r>
+            <a:endParaRPr lang="zh-CN" altLang="en-US" sz="4000" dirty="0">
+              <a:solidFill>
+                <a:schemeClr val="bg1">
+                  <a:lumMod val="65000"/>
+                  <a:lumOff val="35000"/>
+                </a:schemeClr>
+              </a:solidFill>
+              <a:cs typeface="+mn-ea"/>
+              <a:sym typeface="+mn-lt"/>
+            </a:endParaRPr>
+          </a:p>
+        </p:txBody>
+      </p:sp>
+      <p:sp>
+        <p:nvSpPr>
+          <p:cNvPr id="5" name="Shape 62"/>
+          <p:cNvSpPr/>
+          <p:nvPr/>
+        </p:nvSpPr>
+        <p:spPr>
+          <a:xfrm>
+            <a:off x="12069395" y="6497665"/>
+            <a:ext cx="666849" cy="800219"/>
+          </a:xfrm>
+          <a:prstGeom prst="rect">
+            <a:avLst/>
+          </a:prstGeom>
+          <a:ln w="12700">
+            <a:miter lim="400000"/>
+          </a:ln>
+        </p:spPr>
+        <p:txBody>
+          <a:bodyPr wrap="none" lIns="0" tIns="0" rIns="0" bIns="0" anchor="ctr">
+            <a:spAutoFit/>
+          </a:bodyPr>
+          <a:lstStyle>
+            <a:lvl1pPr>
+              <a:defRPr sz="5200">
+                <a:solidFill>
+                  <a:srgbClr val="4F5761"/>
+                </a:solidFill>
+                <a:latin typeface="FontAwesome"/>
+                <a:ea typeface="FontAwesome"/>
+                <a:cs typeface="FontAwesome"/>
+                <a:sym typeface="FontAwesome"/>
+              </a:defRPr>
+            </a:lvl1pPr>
+          </a:lstStyle>
+          <a:p>
+            <a:pPr lvl="0">
+              <a:defRPr sz="1800">
+                <a:solidFill>
+                  <a:srgbClr val="000000"/>
+                </a:solidFill>
+              </a:defRPr>
+            </a:pPr>
+            <a:r>
+              <a:rPr sz="5200">
+                <a:solidFill>
+                  <a:srgbClr val="4F5761"/>
+                </a:solidFill>
+                <a:latin typeface="+mn-lt"/>
+                <a:ea typeface="+mn-ea"/>
+                <a:cs typeface="+mn-ea"/>
+                <a:sym typeface="+mn-lt"/>
+              </a:rPr>
+              <a:t></a:t>
+            </a:r>
+            <a:endParaRPr sz="5200">
+              <a:solidFill>
+                <a:srgbClr val="4F5761"/>
+              </a:solidFill>
+              <a:latin typeface="+mn-lt"/>
+              <a:ea typeface="+mn-ea"/>
+              <a:cs typeface="+mn-ea"/>
+              <a:sym typeface="+mn-lt"/>
+            </a:endParaRPr>
+          </a:p>
+        </p:txBody>
+      </p:sp>
+      <p:sp>
+        <p:nvSpPr>
+          <p:cNvPr id="6" name="Shape 58"/>
+          <p:cNvSpPr/>
+          <p:nvPr/>
+        </p:nvSpPr>
+        <p:spPr>
+          <a:xfrm>
+            <a:off x="17372330" y="4358005"/>
+            <a:ext cx="4667250" cy="4872990"/>
+          </a:xfrm>
+          <a:custGeom>
+            <a:avLst/>
+            <a:gdLst/>
+            <a:ahLst/>
+            <a:cxnLst>
+              <a:cxn ang="0">
+                <a:pos x="wd2" y="hd2"/>
+              </a:cxn>
+              <a:cxn ang="5400000">
+                <a:pos x="wd2" y="hd2"/>
+              </a:cxn>
+              <a:cxn ang="10800000">
+                <a:pos x="wd2" y="hd2"/>
+              </a:cxn>
+              <a:cxn ang="16200000">
+                <a:pos x="wd2" y="hd2"/>
+              </a:cxn>
+            </a:cxnLst>
+            <a:rect l="0" t="0" r="r" b="b"/>
+            <a:pathLst>
+              <a:path w="19679" h="19679" extrusionOk="0">
+                <a:moveTo>
+                  <a:pt x="16796" y="2882"/>
+                </a:moveTo>
+                <a:cubicBezTo>
+                  <a:pt x="20639" y="6724"/>
+                  <a:pt x="20639" y="12954"/>
+                  <a:pt x="16796" y="16796"/>
+                </a:cubicBezTo>
+                <a:cubicBezTo>
+                  <a:pt x="12954" y="20639"/>
+                  <a:pt x="6724" y="20639"/>
+                  <a:pt x="2882" y="16796"/>
+                </a:cubicBezTo>
+                <a:cubicBezTo>
+                  <a:pt x="-961" y="12954"/>
+                  <a:pt x="-961" y="6724"/>
+                  <a:pt x="2882" y="2882"/>
+                </a:cubicBezTo>
+                <a:cubicBezTo>
+                  <a:pt x="6724" y="-961"/>
+                  <a:pt x="12954" y="-961"/>
+                  <a:pt x="16796" y="2882"/>
+                </a:cubicBezTo>
+                <a:close/>
+              </a:path>
+            </a:pathLst>
+          </a:custGeom>
+          <a:gradFill>
+            <a:gsLst>
+              <a:gs pos="26200">
+                <a:srgbClr val="69686A"/>
+              </a:gs>
+              <a:gs pos="48394">
+                <a:srgbClr val="6F1F35"/>
+              </a:gs>
+              <a:gs pos="67832">
+                <a:srgbClr val="727F8D"/>
+              </a:gs>
+              <a:gs pos="100000">
+                <a:srgbClr val="A3B5CA"/>
+              </a:gs>
+            </a:gsLst>
+          </a:gradFill>
+          <a:ln w="12700">
+            <a:miter lim="400000"/>
+          </a:ln>
+        </p:spPr>
+        <p:txBody>
+          <a:bodyPr lIns="0" tIns="0" rIns="0" bIns="0" anchor="ctr"/>
+          <a:lstStyle/>
+          <a:p>
+            <a:pPr lvl="0">
+              <a:defRPr sz="3600"/>
+            </a:pPr>
+            <a:endParaRPr>
+              <a:cs typeface="+mn-ea"/>
+              <a:sym typeface="+mn-lt"/>
+            </a:endParaRPr>
+          </a:p>
+        </p:txBody>
+      </p:sp>
+      <p:sp>
+        <p:nvSpPr>
+          <p:cNvPr id="7" name="Shape 59"/>
+          <p:cNvSpPr/>
+          <p:nvPr/>
+        </p:nvSpPr>
+        <p:spPr>
+          <a:xfrm>
+            <a:off x="17598924" y="4750738"/>
+            <a:ext cx="4214062" cy="4214062"/>
+          </a:xfrm>
+          <a:custGeom>
+            <a:avLst/>
+            <a:gdLst/>
+            <a:ahLst/>
+            <a:cxnLst>
+              <a:cxn ang="0">
+                <a:pos x="wd2" y="hd2"/>
+              </a:cxn>
+              <a:cxn ang="5400000">
+                <a:pos x="wd2" y="hd2"/>
+              </a:cxn>
+              <a:cxn ang="10800000">
+                <a:pos x="wd2" y="hd2"/>
+              </a:cxn>
+              <a:cxn ang="16200000">
+                <a:pos x="wd2" y="hd2"/>
+              </a:cxn>
+            </a:cxnLst>
+            <a:rect l="0" t="0" r="r" b="b"/>
+            <a:pathLst>
+              <a:path w="19679" h="19679" extrusionOk="0">
+                <a:moveTo>
+                  <a:pt x="16796" y="2882"/>
+                </a:moveTo>
+                <a:cubicBezTo>
+                  <a:pt x="20639" y="6724"/>
+                  <a:pt x="20639" y="12954"/>
+                  <a:pt x="16796" y="16796"/>
+                </a:cubicBezTo>
+                <a:cubicBezTo>
+                  <a:pt x="12954" y="20639"/>
+                  <a:pt x="6724" y="20639"/>
+                  <a:pt x="2882" y="16796"/>
+                </a:cubicBezTo>
+                <a:cubicBezTo>
+                  <a:pt x="-961" y="12954"/>
+                  <a:pt x="-961" y="6724"/>
+                  <a:pt x="2882" y="2882"/>
+                </a:cubicBezTo>
+                <a:cubicBezTo>
+                  <a:pt x="6724" y="-961"/>
+                  <a:pt x="12954" y="-961"/>
+                  <a:pt x="16796" y="2882"/>
+                </a:cubicBezTo>
+                <a:close/>
+              </a:path>
+            </a:pathLst>
+          </a:custGeom>
+          <a:solidFill>
+            <a:srgbClr val="E6E4E8"/>
+          </a:solidFill>
+          <a:ln w="12700">
+            <a:miter lim="400000"/>
+          </a:ln>
+        </p:spPr>
+        <p:txBody>
+          <a:bodyPr lIns="0" tIns="0" rIns="0" bIns="0" anchor="ctr"/>
+          <a:lstStyle/>
+          <a:p>
+            <a:pPr lvl="0">
+              <a:defRPr sz="3600"/>
+            </a:pPr>
+            <a:endParaRPr>
+              <a:cs typeface="+mn-ea"/>
+              <a:sym typeface="+mn-lt"/>
+            </a:endParaRPr>
+          </a:p>
+        </p:txBody>
+      </p:sp>
+      <p:sp>
+        <p:nvSpPr>
+          <p:cNvPr id="8" name="Shape 60"/>
+          <p:cNvSpPr/>
+          <p:nvPr/>
+        </p:nvSpPr>
+        <p:spPr>
+          <a:xfrm>
+            <a:off x="17712026" y="6499312"/>
+            <a:ext cx="3987857" cy="716915"/>
+          </a:xfrm>
+          <a:prstGeom prst="rect">
+            <a:avLst/>
+          </a:prstGeom>
+          <a:ln w="12700">
+            <a:miter lim="400000"/>
+          </a:ln>
+        </p:spPr>
+        <p:txBody>
+          <a:bodyPr lIns="50800" tIns="50800" rIns="50800" bIns="50800" anchor="ctr">
+            <a:spAutoFit/>
+          </a:bodyPr>
+          <a:lstStyle/>
+          <a:p>
+            <a:pPr lvl="0">
+              <a:defRPr sz="1800">
+                <a:solidFill>
+                  <a:srgbClr val="000000"/>
+                </a:solidFill>
+              </a:defRPr>
+            </a:pPr>
+            <a:r>
+              <a:rPr lang="zh-CN" altLang="en-US" sz="4000" dirty="0">
+                <a:solidFill>
+                  <a:schemeClr val="bg1">
+                    <a:lumMod val="65000"/>
+                    <a:lumOff val="35000"/>
+                  </a:schemeClr>
+                </a:solidFill>
+                <a:cs typeface="+mn-ea"/>
+                <a:sym typeface="+mn-lt"/>
+              </a:rPr>
+              <a:t>第三章 相关实验</a:t>
+            </a:r>
+            <a:endParaRPr lang="zh-CN" altLang="en-US" sz="4000" dirty="0">
+              <a:solidFill>
+                <a:schemeClr val="bg1">
+                  <a:lumMod val="65000"/>
+                  <a:lumOff val="35000"/>
+                </a:schemeClr>
+              </a:solidFill>
+              <a:cs typeface="+mn-ea"/>
+              <a:sym typeface="+mn-lt"/>
+            </a:endParaRPr>
+          </a:p>
+        </p:txBody>
+      </p:sp>
+      <p:sp>
+        <p:nvSpPr>
+          <p:cNvPr id="9" name="Shape 62"/>
+          <p:cNvSpPr/>
+          <p:nvPr/>
+        </p:nvSpPr>
+        <p:spPr>
+          <a:xfrm>
+            <a:off x="19372530" y="6457660"/>
+            <a:ext cx="666849" cy="800219"/>
+          </a:xfrm>
+          <a:prstGeom prst="rect">
+            <a:avLst/>
+          </a:prstGeom>
+          <a:ln w="12700">
+            <a:miter lim="400000"/>
+          </a:ln>
+        </p:spPr>
+        <p:txBody>
+          <a:bodyPr wrap="none" lIns="0" tIns="0" rIns="0" bIns="0" anchor="ctr">
+            <a:spAutoFit/>
+          </a:bodyPr>
+          <a:lstStyle>
+            <a:lvl1pPr>
+              <a:defRPr sz="5200">
+                <a:solidFill>
+                  <a:srgbClr val="4F5761"/>
+                </a:solidFill>
+                <a:latin typeface="FontAwesome"/>
+                <a:ea typeface="FontAwesome"/>
+                <a:cs typeface="FontAwesome"/>
+                <a:sym typeface="FontAwesome"/>
+              </a:defRPr>
+            </a:lvl1pPr>
+          </a:lstStyle>
+          <a:p>
+            <a:pPr lvl="0">
+              <a:defRPr sz="1800">
+                <a:solidFill>
+                  <a:srgbClr val="000000"/>
+                </a:solidFill>
+              </a:defRPr>
+            </a:pPr>
+            <a:r>
+              <a:rPr sz="5200">
+                <a:solidFill>
+                  <a:srgbClr val="4F5761"/>
+                </a:solidFill>
+                <a:latin typeface="+mn-lt"/>
+                <a:ea typeface="+mn-ea"/>
+                <a:cs typeface="+mn-ea"/>
+                <a:sym typeface="+mn-lt"/>
+              </a:rPr>
+              <a:t></a:t>
+            </a:r>
+            <a:endParaRPr sz="5200">
+              <a:solidFill>
+                <a:srgbClr val="4F5761"/>
+              </a:solidFill>
+              <a:latin typeface="+mn-lt"/>
+              <a:ea typeface="+mn-ea"/>
+              <a:cs typeface="+mn-ea"/>
+              <a:sym typeface="+mn-lt"/>
+            </a:endParaRPr>
+          </a:p>
+        </p:txBody>
+      </p:sp>
+    </p:spTree>
+  </p:cSld>
+  <p:clrMapOvr>
+    <a:masterClrMapping/>
+  </p:clrMapOvr>
+  <mc:AlternateContent xmlns:mc="http://schemas.openxmlformats.org/markup-compatibility/2006">
+    <mc:Choice xmlns:p15="http://schemas.microsoft.com/office/powerpoint/2012/main" Requires="p15">
+      <p:transition xmlns:p14="http://schemas.microsoft.com/office/powerpoint/2010/main" Requires="p14" p14:dur="500">
+        <p15:prstTrans prst="pageCurlDouble"/>
+      </p:transition>
+    </mc:Choice>
+    <mc:Fallback>
+      <p:transition>
+        <p:fade/>
+      </p:transition>
+    </mc:Fallback>
+  </mc:AlternateContent>
+</p:sld>
+</file>
+
+<file path=ppt/slides/slide3.xml><?xml version="1.0" encoding="utf-8"?>
 <p:sld xmlns:a="http://schemas.openxmlformats.org/drawingml/2006/main" xmlns:r="http://schemas.openxmlformats.org/officeDocument/2006/relationships" xmlns:p="http://schemas.openxmlformats.org/presentationml/2006/main">
   <p:cSld>
     <p:spTree>
@@ -3755,7 +5815,7 @@
 </p:sld>
 </file>
 
-<file path=ppt/slides/slide3.xml><?xml version="1.0" encoding="utf-8"?>
+<file path=ppt/slides/slide4.xml><?xml version="1.0" encoding="utf-8"?>
 <p:sld xmlns:a="http://schemas.openxmlformats.org/drawingml/2006/main" xmlns:r="http://schemas.openxmlformats.org/officeDocument/2006/relationships" xmlns:p="http://schemas.openxmlformats.org/presentationml/2006/main">
   <p:cSld>
     <p:spTree>
@@ -3979,8 +6039,8 @@
         </p:nvSpPr>
         <p:spPr>
           <a:xfrm>
-            <a:off x="12858750" y="2593023"/>
-            <a:ext cx="11104245" cy="2071370"/>
+            <a:off x="13347065" y="2593658"/>
+            <a:ext cx="10604500" cy="2071370"/>
           </a:xfrm>
           <a:prstGeom prst="rect">
             <a:avLst/>
@@ -4081,7 +6141,17 @@
                 <a:cs typeface="+mn-ea"/>
                 <a:sym typeface="+mn-lt"/>
               </a:rPr>
-              <a:t>算法为例，在分析了该算法后为其设计了一系列实验来验证算法性能，并利用实验分析了影响算法性能的一些因素。</a:t>
+              <a:t>算法为例，分析了算法的特点并为其设计了一系列实验来检验算法性能和</a:t>
+            </a:r>
+            <a:r>
+              <a:rPr lang="zh-CN" altLang="en-US" sz="3200">
+                <a:solidFill>
+                  <a:srgbClr val="4F5761"/>
+                </a:solidFill>
+                <a:cs typeface="+mn-ea"/>
+                <a:sym typeface="+mn-lt"/>
+              </a:rPr>
+              <a:t>分析影响算法性能的因素。</a:t>
             </a:r>
             <a:endParaRPr kumimoji="0" lang="zh-CN" altLang="en-US" sz="3200" b="0" i="0" u="none" strike="noStrike" cap="none" spc="0" normalizeH="0" baseline="0">
               <a:ln>
@@ -4206,6 +6276,30 @@
           </a:prstGeom>
         </p:spPr>
       </p:pic>
+      <p:pic>
+        <p:nvPicPr>
+          <p:cNvPr id="3" name="图片 2"/>
+          <p:cNvPicPr>
+            <a:picLocks noChangeAspect="1"/>
+          </p:cNvPicPr>
+          <p:nvPr/>
+        </p:nvPicPr>
+        <p:blipFill>
+          <a:blip r:embed="rId2"/>
+          <a:stretch>
+            <a:fillRect/>
+          </a:stretch>
+        </p:blipFill>
+        <p:spPr>
+          <a:xfrm>
+            <a:off x="15043150" y="5699760"/>
+            <a:ext cx="6684645" cy="6684645"/>
+          </a:xfrm>
+          <a:prstGeom prst="rect">
+            <a:avLst/>
+          </a:prstGeom>
+        </p:spPr>
+      </p:pic>
     </p:spTree>
   </p:cSld>
   <p:clrMapOvr>
@@ -4233,7 +6327,7 @@
 </p:sld>
 </file>
 
-<file path=ppt/slides/slide4.xml><?xml version="1.0" encoding="utf-8"?>
+<file path=ppt/slides/slide5.xml><?xml version="1.0" encoding="utf-8"?>
 <p:sld xmlns:a="http://schemas.openxmlformats.org/drawingml/2006/main" xmlns:r="http://schemas.openxmlformats.org/officeDocument/2006/relationships" xmlns:p="http://schemas.openxmlformats.org/presentationml/2006/main">
   <p:cSld>
     <p:spTree>
@@ -4655,7 +6749,7 @@
 </p:sld>
 </file>
 
-<file path=ppt/slides/slide5.xml><?xml version="1.0" encoding="utf-8"?>
+<file path=ppt/slides/slide6.xml><?xml version="1.0" encoding="utf-8"?>
 <p:sld xmlns:a="http://schemas.openxmlformats.org/drawingml/2006/main" xmlns:r="http://schemas.openxmlformats.org/officeDocument/2006/relationships" xmlns:p="http://schemas.openxmlformats.org/presentationml/2006/main">
   <p:cSld>
     <p:spTree>
@@ -4813,7 +6907,7 @@
         </p:nvSpPr>
         <p:spPr>
           <a:xfrm>
-            <a:off x="3626277" y="5023106"/>
+            <a:off x="3626277" y="5086606"/>
             <a:ext cx="524510" cy="1015365"/>
           </a:xfrm>
           <a:prstGeom prst="rect">
@@ -4880,8 +6974,8 @@
         </p:nvSpPr>
         <p:spPr>
           <a:xfrm>
-            <a:off x="1402583" y="6622733"/>
-            <a:ext cx="4971897" cy="470535"/>
+            <a:off x="1402583" y="6437948"/>
+            <a:ext cx="4971897" cy="840105"/>
           </a:xfrm>
           <a:prstGeom prst="rect">
             <a:avLst/>
@@ -4904,13 +6998,13 @@
               </a:defRPr>
             </a:pPr>
             <a:r>
-              <a:rPr lang="zh-CN" altLang="en-US" sz="2400" dirty="0">
+              <a:rPr lang="zh-CN" altLang="en-US" sz="4800" dirty="0">
                 <a:cs typeface="+mn-ea"/>
                 <a:sym typeface="+mn-lt"/>
               </a:rPr>
               <a:t>先验数据约束</a:t>
             </a:r>
-            <a:endParaRPr lang="zh-CN" altLang="en-US" sz="2400" dirty="0">
+            <a:endParaRPr lang="zh-CN" altLang="en-US" sz="4800" dirty="0">
               <a:cs typeface="+mn-ea"/>
               <a:sym typeface="+mn-lt"/>
             </a:endParaRPr>
@@ -5005,8 +7099,8 @@
         </p:nvSpPr>
         <p:spPr>
           <a:xfrm>
-            <a:off x="1195690" y="7525365"/>
-            <a:ext cx="5385683" cy="716915"/>
+            <a:off x="1165860" y="7525385"/>
+            <a:ext cx="5837555" cy="1393825"/>
           </a:xfrm>
           <a:prstGeom prst="rect">
             <a:avLst/>
@@ -5016,7 +7110,7 @@
           </a:ln>
         </p:spPr>
         <p:txBody>
-          <a:bodyPr lIns="50800" tIns="50800" rIns="50800" bIns="50800" anchor="ctr">
+          <a:bodyPr wrap="square" lIns="50800" tIns="50800" rIns="50800" bIns="50800" anchor="ctr">
             <a:spAutoFit/>
           </a:bodyPr>
           <a:lstStyle>
@@ -5041,7 +7135,7 @@
               </a:defRPr>
             </a:pPr>
             <a:r>
-              <a:rPr lang="zh-CN" sz="2000">
+              <a:rPr lang="zh-CN" sz="2800">
                 <a:solidFill>
                   <a:srgbClr val="4F5761"/>
                 </a:solidFill>
@@ -5052,7 +7146,7 @@
               </a:rPr>
               <a:t>令先验数据自表达，使学习后的矩阵在满足一致性约束的同时又能挖掘出新的关联。</a:t>
             </a:r>
-            <a:endParaRPr lang="zh-CN" sz="2000">
+            <a:endParaRPr lang="zh-CN" sz="2800">
               <a:solidFill>
                 <a:srgbClr val="4F5761"/>
               </a:solidFill>
@@ -5226,8 +7320,8 @@
         </p:nvSpPr>
         <p:spPr>
           <a:xfrm>
-            <a:off x="9707184" y="6668770"/>
-            <a:ext cx="5385681" cy="378460"/>
+            <a:off x="9707184" y="6437948"/>
+            <a:ext cx="5385681" cy="840105"/>
           </a:xfrm>
           <a:prstGeom prst="rect">
             <a:avLst/>
@@ -5262,7 +7356,7 @@
               </a:defRPr>
             </a:pPr>
             <a:r>
-              <a:rPr lang="zh-CN" altLang="en-US" dirty="0">
+              <a:rPr lang="zh-CN" altLang="en-US" sz="4800" dirty="0">
                 <a:latin typeface="+mn-lt"/>
                 <a:ea typeface="+mn-ea"/>
                 <a:cs typeface="+mn-ea"/>
@@ -5270,7 +7364,7 @@
               </a:rPr>
               <a:t>重构线性流形</a:t>
             </a:r>
-            <a:endParaRPr sz="2400" b="1" dirty="0">
+            <a:endParaRPr lang="zh-CN" altLang="en-US" sz="4800" b="1" dirty="0">
               <a:solidFill>
                 <a:srgbClr val="4F5761"/>
               </a:solidFill>
@@ -5290,7 +7384,7 @@
         </p:nvSpPr>
         <p:spPr>
           <a:xfrm>
-            <a:off x="20290284" y="5347513"/>
+            <a:off x="20290284" y="5348148"/>
             <a:ext cx="410369" cy="492443"/>
           </a:xfrm>
           <a:prstGeom prst="rect">
@@ -5357,8 +7451,8 @@
         </p:nvSpPr>
         <p:spPr>
           <a:xfrm>
-            <a:off x="17802626" y="6668770"/>
-            <a:ext cx="5385684" cy="378460"/>
+            <a:off x="17802626" y="6468745"/>
+            <a:ext cx="5385684" cy="778510"/>
           </a:xfrm>
           <a:prstGeom prst="rect">
             <a:avLst/>
@@ -5393,7 +7487,7 @@
               </a:defRPr>
             </a:pPr>
             <a:r>
-              <a:rPr lang="zh-CN" altLang="en-US" dirty="0">
+              <a:rPr lang="zh-CN" altLang="en-US" sz="4400" dirty="0">
                 <a:latin typeface="+mn-lt"/>
                 <a:ea typeface="+mn-ea"/>
                 <a:cs typeface="+mn-ea"/>
@@ -5401,7 +7495,7 @@
               </a:rPr>
               <a:t>协同学习</a:t>
             </a:r>
-            <a:endParaRPr lang="zh-CN" altLang="en-US" dirty="0">
+            <a:endParaRPr lang="zh-CN" altLang="en-US" sz="4400" dirty="0">
               <a:latin typeface="+mn-lt"/>
               <a:ea typeface="+mn-ea"/>
               <a:cs typeface="+mn-ea"/>
@@ -5548,7 +7642,7 @@
             <a:r>
               <a:rPr lang="en-US" sz="2400">
                 <a:solidFill>
-                  <a:srgbClr val="4F5761"/>
+                  <a:srgbClr val="6F1F35"/>
                 </a:solidFill>
                 <a:latin typeface="+mn-lt"/>
                 <a:ea typeface="+mn-ea"/>
@@ -5559,7 +7653,7 @@
             </a:r>
             <a:endParaRPr lang="en-US" sz="2400">
               <a:solidFill>
-                <a:srgbClr val="4F5761"/>
+                <a:srgbClr val="6F1F35"/>
               </a:solidFill>
               <a:latin typeface="+mn-lt"/>
               <a:ea typeface="+mn-ea"/>
@@ -5603,7 +7697,7 @@
             <a:r>
               <a:rPr lang="en-US" altLang="zh-CN" sz="4400" dirty="0">
                 <a:solidFill>
-                  <a:srgbClr val="4F5761"/>
+                  <a:srgbClr val="6F1F35"/>
                 </a:solidFill>
                 <a:cs typeface="+mn-ea"/>
                 <a:sym typeface="+mn-lt"/>
@@ -5613,14 +7707,14 @@
             <a:r>
               <a:rPr lang="zh-CN" altLang="en-US" sz="4400" dirty="0">
                 <a:solidFill>
-                  <a:srgbClr val="4F5761"/>
+                  <a:srgbClr val="6F1F35"/>
                 </a:solidFill>
                 <a:cs typeface="+mn-ea"/>
                 <a:sym typeface="+mn-lt"/>
               </a:rPr>
               <a:t>算法介绍</a:t>
             </a:r>
-            <a:endParaRPr sz="4400" dirty="0">
+            <a:endParaRPr lang="zh-CN" altLang="en-US" sz="4400" dirty="0">
               <a:solidFill>
                 <a:srgbClr val="6F1F35"/>
               </a:solidFill>
@@ -5638,8 +7732,8 @@
         </p:nvSpPr>
         <p:spPr>
           <a:xfrm>
-            <a:off x="9707182" y="7525364"/>
-            <a:ext cx="5385684" cy="716915"/>
+            <a:off x="9403080" y="7740650"/>
+            <a:ext cx="5993130" cy="963295"/>
           </a:xfrm>
           <a:prstGeom prst="rect">
             <a:avLst/>
@@ -5649,7 +7743,7 @@
           </a:ln>
         </p:spPr>
         <p:txBody>
-          <a:bodyPr lIns="50800" tIns="50800" rIns="50800" bIns="50800" anchor="ctr">
+          <a:bodyPr wrap="square" lIns="50800" tIns="50800" rIns="50800" bIns="50800" anchor="ctr">
             <a:spAutoFit/>
           </a:bodyPr>
           <a:lstStyle>
@@ -5674,7 +7768,7 @@
               </a:defRPr>
             </a:pPr>
             <a:r>
-              <a:rPr lang="zh-CN" sz="2000">
+              <a:rPr lang="zh-CN" sz="2800">
                 <a:solidFill>
                   <a:srgbClr val="4F5761"/>
                 </a:solidFill>
@@ -5683,9 +7777,21 @@
                 <a:cs typeface="+mn-ea"/>
                 <a:sym typeface="+mn-lt"/>
               </a:rPr>
-              <a:t>使用目标矩阵重构关联矩阵，利用重构后两个矩阵结构的一致性构造损失函数。</a:t>
-            </a:r>
-            <a:endParaRPr lang="zh-CN" sz="2000">
+              <a:t>利用重构后的矩阵与原矩阵结构的一致性来</a:t>
+            </a:r>
+            <a:r>
+              <a:rPr lang="zh-CN" sz="2800">
+                <a:solidFill>
+                  <a:srgbClr val="4F5761"/>
+                </a:solidFill>
+                <a:latin typeface="+mn-lt"/>
+                <a:ea typeface="+mn-ea"/>
+                <a:cs typeface="+mn-ea"/>
+                <a:sym typeface="+mn-lt"/>
+              </a:rPr>
+              <a:t>构造损失函数。</a:t>
+            </a:r>
+            <a:endParaRPr lang="zh-CN" sz="2800">
               <a:solidFill>
                 <a:srgbClr val="4F5761"/>
               </a:solidFill>
@@ -5705,8 +7811,8 @@
         </p:nvSpPr>
         <p:spPr>
           <a:xfrm>
-            <a:off x="17802626" y="7525364"/>
-            <a:ext cx="5385684" cy="716915"/>
+            <a:off x="17470755" y="7525385"/>
+            <a:ext cx="6049010" cy="1393825"/>
           </a:xfrm>
           <a:prstGeom prst="rect">
             <a:avLst/>
@@ -5716,7 +7822,7 @@
           </a:ln>
         </p:spPr>
         <p:txBody>
-          <a:bodyPr lIns="50800" tIns="50800" rIns="50800" bIns="50800" anchor="ctr">
+          <a:bodyPr wrap="square" lIns="50800" tIns="50800" rIns="50800" bIns="50800" anchor="ctr">
             <a:spAutoFit/>
           </a:bodyPr>
           <a:lstStyle>
@@ -5741,7 +7847,7 @@
               </a:defRPr>
             </a:pPr>
             <a:r>
-              <a:rPr lang="zh-CN" sz="2000">
+              <a:rPr lang="zh-CN" sz="2800">
                 <a:solidFill>
                   <a:srgbClr val="4F5761"/>
                 </a:solidFill>
@@ -5750,9 +7856,9 @@
                 <a:cs typeface="+mn-ea"/>
                 <a:sym typeface="+mn-lt"/>
               </a:rPr>
-              <a:t>引入辅助信息构造双流形结构，利用两个流形结构的一致性构造新的双边协同学习模型。</a:t>
-            </a:r>
-            <a:endParaRPr lang="zh-CN" sz="2000">
+              <a:t>引入辅助信息构造双流形结构，利用两个流形结构的一致性构造双边协同学习模型。</a:t>
+            </a:r>
+            <a:endParaRPr lang="zh-CN" sz="2800">
               <a:solidFill>
                 <a:srgbClr val="4F5761"/>
               </a:solidFill>
@@ -5820,7 +7926,7 @@
 </p:sld>
 </file>
 
-<file path=ppt/slides/slide6.xml><?xml version="1.0" encoding="utf-8"?>
+<file path=ppt/slides/slide7.xml><?xml version="1.0" encoding="utf-8"?>
 <p:sld xmlns:a="http://schemas.openxmlformats.org/drawingml/2006/main" xmlns:r="http://schemas.openxmlformats.org/officeDocument/2006/relationships" xmlns:p="http://schemas.openxmlformats.org/presentationml/2006/main">
   <p:cSld>
     <p:spTree>
@@ -6222,7 +8328,7 @@
 </p:sld>
 </file>
 
-<file path=ppt/slides/slide7.xml><?xml version="1.0" encoding="utf-8"?>
+<file path=ppt/slides/slide8.xml><?xml version="1.0" encoding="utf-8"?>
 <p:sld xmlns:a="http://schemas.openxmlformats.org/drawingml/2006/main" xmlns:r="http://schemas.openxmlformats.org/officeDocument/2006/relationships" xmlns:p="http://schemas.openxmlformats.org/presentationml/2006/main">
   <p:cSld>
     <p:spTree>
@@ -6351,8 +8457,8 @@
         </p:nvSpPr>
         <p:spPr>
           <a:xfrm>
-            <a:off x="4771642" y="10230348"/>
-            <a:ext cx="15204553" cy="1934612"/>
+            <a:off x="4078605" y="9367520"/>
+            <a:ext cx="16981805" cy="3331210"/>
           </a:xfrm>
           <a:prstGeom prst="rect">
             <a:avLst/>
@@ -6396,8 +8502,26 @@
               </a:rPr>
               <a:t>	</a:t>
             </a:r>
-            <a:r>
-              <a:rPr lang="zh-CN" sz="3200" dirty="0" err="1">
+            <a:endParaRPr lang="zh-CN" sz="3200" dirty="0" err="1">
+              <a:solidFill>
+                <a:srgbClr val="4F5761"/>
+              </a:solidFill>
+              <a:latin typeface="+mn-lt"/>
+              <a:ea typeface="+mn-ea"/>
+              <a:cs typeface="+mn-ea"/>
+              <a:sym typeface="+mn-lt"/>
+            </a:endParaRPr>
+          </a:p>
+          <a:p>
+            <a:pPr lvl="0">
+              <a:defRPr sz="1800">
+                <a:solidFill>
+                  <a:srgbClr val="000000"/>
+                </a:solidFill>
+              </a:defRPr>
+            </a:pPr>
+            <a:r>
+              <a:rPr lang="en-US" altLang="zh-CN" sz="3200" dirty="0" err="1">
                 <a:solidFill>
                   <a:srgbClr val="4F5761"/>
                 </a:solidFill>
@@ -6406,8 +8530,55 @@
                 <a:cs typeface="+mn-ea"/>
                 <a:sym typeface="+mn-lt"/>
               </a:rPr>
-              <a:t>仅通过对比表格数据得到算法较优的结论并不严谨，还需要通过统计分析给出统计意义上的结论。为此，论文又进行了弗里德曼检验，计算出了临界值域后得到了上述图中的结果。从图中可直观的看出，</a:t>
-            </a:r>
+              <a:t>	</a:t>
+            </a:r>
+            <a:r>
+              <a:rPr lang="zh-CN" altLang="en-US" sz="3200" dirty="0" err="1">
+                <a:solidFill>
+                  <a:srgbClr val="4F5761"/>
+                </a:solidFill>
+                <a:latin typeface="+mj-lt"/>
+                <a:ea typeface="+mj-lt"/>
+                <a:cs typeface="+mn-ea"/>
+                <a:sym typeface="+mn-lt"/>
+              </a:rPr>
+              <a:t>许多算法</a:t>
+            </a:r>
+            <a:r>
+              <a:rPr lang="zh-CN" sz="3200" dirty="0" err="1">
+                <a:solidFill>
+                  <a:srgbClr val="4F5761"/>
+                </a:solidFill>
+                <a:latin typeface="+mj-lt"/>
+                <a:ea typeface="+mj-lt"/>
+                <a:cs typeface="+mn-ea"/>
+                <a:sym typeface="+mn-lt"/>
+              </a:rPr>
+              <a:t>仅通过对比表格数据来判断算法的优劣，这并不严谨，还需要通过统计分析给出统计意义上的结论。为此，论文又进行了弗里德曼检验，在计算出了临界值域后得到了如上图所示的结果。圆点代表算法的平均性能，横线为临界值域。</a:t>
+            </a:r>
+            <a:endParaRPr kumimoji="0" lang="zh-CN" altLang="en-US" sz="3200" b="0" i="0" u="none" strike="noStrike" cap="none" spc="0" normalizeH="0" baseline="0" dirty="0" err="1">
+              <a:ln>
+                <a:noFill/>
+              </a:ln>
+              <a:solidFill>
+                <a:srgbClr val="4F5761"/>
+              </a:solidFill>
+              <a:effectLst/>
+              <a:uFillTx/>
+              <a:latin typeface="+mn-lt"/>
+              <a:ea typeface="+mn-ea"/>
+              <a:cs typeface="+mn-ea"/>
+              <a:sym typeface="+mn-lt"/>
+            </a:endParaRPr>
+          </a:p>
+          <a:p>
+            <a:pPr lvl="0">
+              <a:defRPr sz="1800">
+                <a:solidFill>
+                  <a:srgbClr val="000000"/>
+                </a:solidFill>
+              </a:defRPr>
+            </a:pPr>
             <a:r>
               <a:rPr lang="en-US" altLang="zh-CN" sz="3200" dirty="0" err="1">
                 <a:solidFill>
@@ -6418,10 +8589,10 @@
                 <a:cs typeface="+mn-ea"/>
                 <a:sym typeface="+mn-lt"/>
               </a:rPr>
-              <a:t>CLML</a:t>
-            </a:r>
-            <a:r>
-              <a:rPr lang="zh-CN" altLang="en-US" sz="3200" dirty="0" err="1">
+              <a:t>	</a:t>
+            </a:r>
+            <a:r>
+              <a:rPr lang="zh-CN" sz="3200" dirty="0" err="1">
                 <a:solidFill>
                   <a:srgbClr val="4F5761"/>
                 </a:solidFill>
@@ -6430,9 +8601,93 @@
                 <a:cs typeface="+mn-ea"/>
                 <a:sym typeface="+mn-lt"/>
               </a:rPr>
-              <a:t>与大部分算法有着显著差别，而与基于矩阵分解的算法差别不显著，但平均仍较优。</a:t>
+              <a:t>从图中可直观的看出：</a:t>
+            </a:r>
+            <a:endParaRPr lang="zh-CN" sz="3200" dirty="0" err="1">
+              <a:solidFill>
+                <a:srgbClr val="4F5761"/>
+              </a:solidFill>
+              <a:latin typeface="+mn-lt"/>
+              <a:ea typeface="+mn-ea"/>
+              <a:cs typeface="+mn-ea"/>
+              <a:sym typeface="+mn-lt"/>
+            </a:endParaRPr>
+          </a:p>
+          <a:p>
+            <a:pPr lvl="0">
+              <a:defRPr sz="1800">
+                <a:solidFill>
+                  <a:srgbClr val="000000"/>
+                </a:solidFill>
+              </a:defRPr>
+            </a:pPr>
+            <a:r>
+              <a:rPr lang="en-US" altLang="zh-CN" sz="3200" dirty="0" err="1">
+                <a:solidFill>
+                  <a:srgbClr val="4F5761"/>
+                </a:solidFill>
+                <a:latin typeface="+mn-lt"/>
+                <a:ea typeface="+mn-ea"/>
+                <a:cs typeface="+mn-ea"/>
+                <a:sym typeface="+mn-lt"/>
+              </a:rPr>
+              <a:t>		1. CLML</a:t>
+            </a:r>
+            <a:r>
+              <a:rPr lang="zh-CN" altLang="en-US" sz="3200" dirty="0" err="1">
+                <a:solidFill>
+                  <a:srgbClr val="4F5761"/>
+                </a:solidFill>
+                <a:latin typeface="+mn-lt"/>
+                <a:ea typeface="+mn-ea"/>
+                <a:cs typeface="+mn-ea"/>
+                <a:sym typeface="+mn-lt"/>
+              </a:rPr>
+              <a:t>与大部分算法有着显著差别；</a:t>
             </a:r>
             <a:endParaRPr lang="zh-CN" altLang="en-US" sz="3200" dirty="0" err="1">
+              <a:solidFill>
+                <a:srgbClr val="4F5761"/>
+              </a:solidFill>
+              <a:latin typeface="+mn-lt"/>
+              <a:ea typeface="+mn-ea"/>
+              <a:cs typeface="+mn-ea"/>
+              <a:sym typeface="+mn-lt"/>
+            </a:endParaRPr>
+          </a:p>
+          <a:p>
+            <a:pPr lvl="0">
+              <a:defRPr sz="1800">
+                <a:solidFill>
+                  <a:srgbClr val="000000"/>
+                </a:solidFill>
+              </a:defRPr>
+            </a:pPr>
+            <a:r>
+              <a:rPr lang="en-US" altLang="zh-CN" sz="3200" dirty="0" err="1">
+                <a:solidFill>
+                  <a:srgbClr val="4F5761"/>
+                </a:solidFill>
+                <a:latin typeface="+mn-lt"/>
+                <a:ea typeface="+mn-ea"/>
+                <a:cs typeface="+mn-ea"/>
+                <a:sym typeface="+mn-lt"/>
+              </a:rPr>
+              <a:t>		2. </a:t>
+            </a:r>
+            <a:r>
+              <a:rPr lang="zh-CN" altLang="en-US" sz="3200" dirty="0" err="1">
+                <a:solidFill>
+                  <a:srgbClr val="4F5761"/>
+                </a:solidFill>
+                <a:latin typeface="+mn-lt"/>
+                <a:ea typeface="+mn-ea"/>
+                <a:cs typeface="+mn-ea"/>
+                <a:sym typeface="+mn-lt"/>
+              </a:rPr>
+              <a:t>虽然与基于矩阵分解的算法相比差别并不显著，但平均性能仍较优。</a:t>
+            </a:r>
+            <a:endParaRPr lang="en-US" altLang="zh-CN" sz="3200" dirty="0" err="1">
               <a:solidFill>
                 <a:srgbClr val="4F5761"/>
               </a:solidFill>
@@ -6631,7 +8886,7 @@
 </p:sld>
 </file>
 
-<file path=ppt/slides/slide8.xml><?xml version="1.0" encoding="utf-8"?>
+<file path=ppt/slides/slide9.xml><?xml version="1.0" encoding="utf-8"?>
 <p:sld xmlns:a="http://schemas.openxmlformats.org/drawingml/2006/main" xmlns:r="http://schemas.openxmlformats.org/officeDocument/2006/relationships" xmlns:p="http://schemas.openxmlformats.org/presentationml/2006/main">
   <p:cSld>
     <p:spTree>
@@ -6769,7 +9024,7 @@
         </p:blipFill>
         <p:spPr>
           <a:xfrm>
-            <a:off x="1438275" y="4248785"/>
+            <a:off x="11116310" y="4216400"/>
             <a:ext cx="11995150" cy="6723380"/>
           </a:xfrm>
           <a:prstGeom prst="rect">
@@ -6784,13 +9039,13 @@
       </p:pic>
       <p:sp>
         <p:nvSpPr>
-          <p:cNvPr id="588" name="Shape 588"/>
+          <p:cNvPr id="12" name="Shape 588"/>
           <p:cNvSpPr/>
           <p:nvPr/>
         </p:nvSpPr>
         <p:spPr>
           <a:xfrm>
-            <a:off x="14380845" y="4848860"/>
+            <a:off x="1159447" y="4804410"/>
             <a:ext cx="7237095" cy="1477010"/>
           </a:xfrm>
           <a:prstGeom prst="rect">
@@ -6835,10 +9090,10 @@
                 <a:cs typeface="+mn-ea"/>
                 <a:sym typeface="+mn-lt"/>
               </a:rPr>
-              <a:t>我们每次随机从</a:t>
-            </a:r>
-            <a:r>
-              <a:rPr lang="en-US" altLang="zh-CN" sz="2400" dirty="0" err="1">
+              <a:t>我们每次从数据集中随机选取数据来构成固定大小的不同子集。计算子集的聚类系数并对子集依次使用不同的算法进行预测得到每个</a:t>
+            </a:r>
+            <a:r>
+              <a:rPr lang="zh-CN" altLang="en-US" sz="2400" dirty="0" err="1">
                 <a:solidFill>
                   <a:srgbClr val="4F5761"/>
                 </a:solidFill>
@@ -6847,10 +9102,10 @@
                 <a:cs typeface="+mn-ea"/>
                 <a:sym typeface="+mn-lt"/>
               </a:rPr>
-              <a:t>Yelp</a:t>
-            </a:r>
-            <a:r>
-              <a:rPr lang="zh-CN" altLang="en-US" sz="2400" dirty="0" err="1">
+              <a:t>算法的</a:t>
+            </a:r>
+            <a:r>
+              <a:rPr lang="en-US" altLang="zh-CN" sz="2400" dirty="0" err="1">
                 <a:solidFill>
                   <a:srgbClr val="4F5761"/>
                 </a:solidFill>
@@ -6859,10 +9114,10 @@
                 <a:cs typeface="+mn-ea"/>
                 <a:sym typeface="+mn-lt"/>
               </a:rPr>
-              <a:t>数据集选择数据构成固定大小的子集，计算该子集的聚类系数并对子集依次使用不同的算法进行预测得到该算法的</a:t>
-            </a:r>
-            <a:r>
-              <a:rPr lang="en-US" altLang="zh-CN" sz="2400" dirty="0" err="1">
+              <a:t>AUC</a:t>
+            </a:r>
+            <a:r>
+              <a:rPr lang="zh-CN" altLang="en-US" sz="2400" dirty="0" err="1">
                 <a:solidFill>
                   <a:srgbClr val="4F5761"/>
                 </a:solidFill>
@@ -6871,7 +9126,7 @@
                 <a:cs typeface="+mn-ea"/>
                 <a:sym typeface="+mn-lt"/>
               </a:rPr>
-              <a:t>AUC</a:t>
+              <a:t>值。重复多次后，我们得到了如右</a:t>
             </a:r>
             <a:r>
               <a:rPr lang="zh-CN" altLang="en-US" sz="2400" dirty="0" err="1">
@@ -6883,7 +9138,7 @@
                 <a:cs typeface="+mn-ea"/>
                 <a:sym typeface="+mn-lt"/>
               </a:rPr>
-              <a:t>值。重复多次后，我们得到了如上图所示的折线图。</a:t>
+              <a:t>图所示的折线图。</a:t>
             </a:r>
             <a:endParaRPr lang="zh-CN" altLang="en-US" sz="2400" dirty="0" err="1">
               <a:solidFill>
@@ -6899,13 +9154,13 @@
       </p:sp>
       <p:sp>
         <p:nvSpPr>
-          <p:cNvPr id="589" name="Shape 589"/>
+          <p:cNvPr id="13" name="Shape 589"/>
           <p:cNvSpPr/>
           <p:nvPr/>
         </p:nvSpPr>
         <p:spPr>
           <a:xfrm>
-            <a:off x="14368082" y="4261059"/>
+            <a:off x="1159447" y="4216609"/>
             <a:ext cx="6632669" cy="655320"/>
           </a:xfrm>
           <a:prstGeom prst="rect">
@@ -6970,13 +9225,13 @@
       </p:sp>
       <p:sp>
         <p:nvSpPr>
-          <p:cNvPr id="6" name="Shape 588"/>
+          <p:cNvPr id="14" name="Shape 588"/>
           <p:cNvSpPr/>
           <p:nvPr/>
         </p:nvSpPr>
         <p:spPr>
           <a:xfrm>
-            <a:off x="14384020" y="7932420"/>
+            <a:off x="1159447" y="7887970"/>
             <a:ext cx="7237095" cy="368935"/>
           </a:xfrm>
           <a:prstGeom prst="rect">
@@ -7021,19 +9276,7 @@
                 <a:cs typeface="+mn-ea"/>
                 <a:sym typeface="+mn-lt"/>
               </a:rPr>
-              <a:t>聚类系数高的网络结构对预测结果有一定的</a:t>
-            </a:r>
-            <a:r>
-              <a:rPr lang="zh-CN" altLang="en-US" sz="2400" dirty="0" err="1">
-                <a:solidFill>
-                  <a:srgbClr val="4F5761"/>
-                </a:solidFill>
-                <a:latin typeface="+mn-lt"/>
-                <a:ea typeface="+mn-ea"/>
-                <a:cs typeface="+mn-ea"/>
-                <a:sym typeface="+mn-lt"/>
-              </a:rPr>
-              <a:t>促进作用。</a:t>
+              <a:t>聚类系数高的网络结构对预测结果有一定的促进作用。</a:t>
             </a:r>
             <a:endParaRPr lang="zh-CN" altLang="en-US" sz="2400" dirty="0" err="1">
               <a:solidFill>
@@ -7049,13 +9292,13 @@
       </p:sp>
       <p:sp>
         <p:nvSpPr>
-          <p:cNvPr id="7" name="Shape 589"/>
+          <p:cNvPr id="15" name="Shape 589"/>
           <p:cNvSpPr/>
           <p:nvPr/>
         </p:nvSpPr>
         <p:spPr>
           <a:xfrm>
-            <a:off x="14383957" y="7277309"/>
+            <a:off x="1159447" y="7232859"/>
             <a:ext cx="6632669" cy="655320"/>
           </a:xfrm>
           <a:prstGeom prst="rect">
@@ -7130,13 +9373,13 @@
       </p:sp>
       <p:sp>
         <p:nvSpPr>
-          <p:cNvPr id="8" name="Shape 588"/>
+          <p:cNvPr id="16" name="Shape 588"/>
           <p:cNvSpPr/>
           <p:nvPr/>
         </p:nvSpPr>
         <p:spPr>
           <a:xfrm>
-            <a:off x="14377670" y="9681845"/>
+            <a:off x="1159447" y="9637395"/>
             <a:ext cx="7237095" cy="738505"/>
           </a:xfrm>
           <a:prstGeom prst="rect">
@@ -7205,31 +9448,7 @@
                 <a:cs typeface="+mn-ea"/>
                 <a:sym typeface="+mn-lt"/>
               </a:rPr>
-              <a:t>算法在网络</a:t>
-            </a:r>
-            <a:r>
-              <a:rPr lang="zh-CN" altLang="en-US" sz="2400" dirty="0" err="1">
-                <a:solidFill>
-                  <a:srgbClr val="4F5761"/>
-                </a:solidFill>
-                <a:latin typeface="+mn-lt"/>
-                <a:ea typeface="+mn-ea"/>
-                <a:cs typeface="+mn-ea"/>
-                <a:sym typeface="+mn-lt"/>
-              </a:rPr>
-              <a:t>聚类系数上升时，预测准确率的提升效果更显著</a:t>
-            </a:r>
-            <a:r>
-              <a:rPr lang="zh-CN" altLang="en-US" sz="2400" dirty="0" err="1">
-                <a:solidFill>
-                  <a:srgbClr val="4F5761"/>
-                </a:solidFill>
-                <a:latin typeface="+mn-lt"/>
-                <a:ea typeface="+mn-ea"/>
-                <a:cs typeface="+mn-ea"/>
-                <a:sym typeface="+mn-lt"/>
-              </a:rPr>
-              <a:t>。</a:t>
+              <a:t>算法在网络聚类系数上升时，预测准确率的提升效果更显著。</a:t>
             </a:r>
             <a:endParaRPr lang="zh-CN" altLang="en-US" sz="2400" dirty="0" err="1">
               <a:solidFill>
@@ -7245,13 +9464,13 @@
       </p:sp>
       <p:sp>
         <p:nvSpPr>
-          <p:cNvPr id="9" name="Shape 589"/>
+          <p:cNvPr id="17" name="Shape 589"/>
           <p:cNvSpPr/>
           <p:nvPr/>
         </p:nvSpPr>
         <p:spPr>
           <a:xfrm>
-            <a:off x="14377607" y="9026734"/>
+            <a:off x="1159447" y="8982284"/>
             <a:ext cx="6632669" cy="655320"/>
           </a:xfrm>
           <a:prstGeom prst="rect">
@@ -7362,7 +9581,7 @@
                             </p:stCondLst>
                             <p:childTnLst>
                               <p:par>
-                                <p:cTn id="5" presetID="2" presetClass="entr" presetSubtype="4" fill="hold" grpId="0" nodeType="clickEffect">
+                                <p:cTn id="5" presetID="2" presetClass="entr" presetSubtype="4" fill="hold" nodeType="clickEffect">
                                   <p:stCondLst>
                                     <p:cond delay="0"/>
                                   </p:stCondLst>
@@ -7375,7 +9594,7 @@
                                           </p:stCondLst>
                                         </p:cTn>
                                         <p:tgtEl>
-                                          <p:spTgt spid="6"/>
+                                          <p:spTgt spid="481"/>
                                         </p:tgtEl>
                                         <p:attrNameLst>
                                           <p:attrName>style.visibility</p:attrName>
@@ -7389,7 +9608,7 @@
                                       <p:cBhvr additive="base">
                                         <p:cTn id="7" dur="500" fill="hold"/>
                                         <p:tgtEl>
-                                          <p:spTgt spid="6"/>
+                                          <p:spTgt spid="481"/>
                                         </p:tgtEl>
                                         <p:attrNameLst>
                                           <p:attrName>ppt_x</p:attrName>
@@ -7412,80 +9631,7 @@
                                       <p:cBhvr additive="base">
                                         <p:cTn id="8" dur="500" fill="hold"/>
                                         <p:tgtEl>
-                                          <p:spTgt spid="6"/>
-                                        </p:tgtEl>
-                                        <p:attrNameLst>
-                                          <p:attrName>ppt_y</p:attrName>
-                                        </p:attrNameLst>
-                                      </p:cBhvr>
-                                      <p:tavLst>
-                                        <p:tav tm="0">
-                                          <p:val>
-                                            <p:strVal val="1+#ppt_h/2"/>
-                                          </p:val>
-                                        </p:tav>
-                                        <p:tav tm="100000">
-                                          <p:val>
-                                            <p:strVal val="#ppt_y"/>
-                                          </p:val>
-                                        </p:tav>
-                                      </p:tavLst>
-                                    </p:anim>
-                                  </p:childTnLst>
-                                </p:cTn>
-                              </p:par>
-                              <p:par>
-                                <p:cTn id="9" presetID="2" presetClass="entr" presetSubtype="4" fill="hold" grpId="0" nodeType="withEffect">
-                                  <p:stCondLst>
-                                    <p:cond delay="0"/>
-                                  </p:stCondLst>
-                                  <p:childTnLst>
-                                    <p:set>
-                                      <p:cBhvr>
-                                        <p:cTn id="10" dur="1" fill="hold">
-                                          <p:stCondLst>
-                                            <p:cond delay="0"/>
-                                          </p:stCondLst>
-                                        </p:cTn>
-                                        <p:tgtEl>
-                                          <p:spTgt spid="7"/>
-                                        </p:tgtEl>
-                                        <p:attrNameLst>
-                                          <p:attrName>style.visibility</p:attrName>
-                                        </p:attrNameLst>
-                                      </p:cBhvr>
-                                      <p:to>
-                                        <p:strVal val="visible"/>
-                                      </p:to>
-                                    </p:set>
-                                    <p:anim calcmode="lin" valueType="num">
-                                      <p:cBhvr additive="base">
-                                        <p:cTn id="11" dur="500" fill="hold"/>
-                                        <p:tgtEl>
-                                          <p:spTgt spid="7"/>
-                                        </p:tgtEl>
-                                        <p:attrNameLst>
-                                          <p:attrName>ppt_x</p:attrName>
-                                        </p:attrNameLst>
-                                      </p:cBhvr>
-                                      <p:tavLst>
-                                        <p:tav tm="0">
-                                          <p:val>
-                                            <p:strVal val="#ppt_x"/>
-                                          </p:val>
-                                        </p:tav>
-                                        <p:tav tm="100000">
-                                          <p:val>
-                                            <p:strVal val="#ppt_x"/>
-                                          </p:val>
-                                        </p:tav>
-                                      </p:tavLst>
-                                    </p:anim>
-                                    <p:anim calcmode="lin" valueType="num">
-                                      <p:cBhvr additive="base">
-                                        <p:cTn id="12" dur="500" fill="hold"/>
-                                        <p:tgtEl>
-                                          <p:spTgt spid="7"/>
+                                          <p:spTgt spid="481"/>
                                         </p:tgtEl>
                                         <p:attrNameLst>
                                           <p:attrName>ppt_y</p:attrName>
@@ -7514,19 +9660,92 @@
                     </p:cTn>
                   </p:par>
                   <p:par>
-                    <p:cTn id="13" fill="hold">
+                    <p:cTn id="9" fill="hold">
                       <p:stCondLst>
                         <p:cond delay="indefinite"/>
                       </p:stCondLst>
                       <p:childTnLst>
                         <p:par>
-                          <p:cTn id="14" fill="hold">
+                          <p:cTn id="10" fill="hold">
                             <p:stCondLst>
                               <p:cond delay="0"/>
                             </p:stCondLst>
                             <p:childTnLst>
                               <p:par>
-                                <p:cTn id="15" presetID="2" presetClass="entr" presetSubtype="4" fill="hold" grpId="0" nodeType="clickEffect">
+                                <p:cTn id="11" presetID="2" presetClass="entr" presetSubtype="4" fill="hold" grpId="0" nodeType="clickEffect">
+                                  <p:stCondLst>
+                                    <p:cond delay="0"/>
+                                  </p:stCondLst>
+                                  <p:childTnLst>
+                                    <p:set>
+                                      <p:cBhvr>
+                                        <p:cTn id="12" dur="1" fill="hold">
+                                          <p:stCondLst>
+                                            <p:cond delay="0"/>
+                                          </p:stCondLst>
+                                        </p:cTn>
+                                        <p:tgtEl>
+                                          <p:spTgt spid="14"/>
+                                        </p:tgtEl>
+                                        <p:attrNameLst>
+                                          <p:attrName>style.visibility</p:attrName>
+                                        </p:attrNameLst>
+                                      </p:cBhvr>
+                                      <p:to>
+                                        <p:strVal val="visible"/>
+                                      </p:to>
+                                    </p:set>
+                                    <p:anim calcmode="lin" valueType="num">
+                                      <p:cBhvr additive="base">
+                                        <p:cTn id="13" dur="500" fill="hold"/>
+                                        <p:tgtEl>
+                                          <p:spTgt spid="14"/>
+                                        </p:tgtEl>
+                                        <p:attrNameLst>
+                                          <p:attrName>ppt_x</p:attrName>
+                                        </p:attrNameLst>
+                                      </p:cBhvr>
+                                      <p:tavLst>
+                                        <p:tav tm="0">
+                                          <p:val>
+                                            <p:strVal val="#ppt_x"/>
+                                          </p:val>
+                                        </p:tav>
+                                        <p:tav tm="100000">
+                                          <p:val>
+                                            <p:strVal val="#ppt_x"/>
+                                          </p:val>
+                                        </p:tav>
+                                      </p:tavLst>
+                                    </p:anim>
+                                    <p:anim calcmode="lin" valueType="num">
+                                      <p:cBhvr additive="base">
+                                        <p:cTn id="14" dur="500" fill="hold"/>
+                                        <p:tgtEl>
+                                          <p:spTgt spid="14"/>
+                                        </p:tgtEl>
+                                        <p:attrNameLst>
+                                          <p:attrName>ppt_y</p:attrName>
+                                        </p:attrNameLst>
+                                      </p:cBhvr>
+                                      <p:tavLst>
+                                        <p:tav tm="0">
+                                          <p:val>
+                                            <p:strVal val="1+#ppt_h/2"/>
+                                          </p:val>
+                                        </p:tav>
+                                        <p:tav tm="100000">
+                                          <p:val>
+                                            <p:strVal val="#ppt_y"/>
+                                          </p:val>
+                                        </p:tav>
+                                      </p:tavLst>
+                                    </p:anim>
+                                  </p:childTnLst>
+                                </p:cTn>
+                              </p:par>
+                              <p:par>
+                                <p:cTn id="15" presetID="2" presetClass="entr" presetSubtype="4" fill="hold" grpId="0" nodeType="withEffect">
                                   <p:stCondLst>
                                     <p:cond delay="0"/>
                                   </p:stCondLst>
@@ -7539,7 +9758,7 @@
                                           </p:stCondLst>
                                         </p:cTn>
                                         <p:tgtEl>
-                                          <p:spTgt spid="8"/>
+                                          <p:spTgt spid="15"/>
                                         </p:tgtEl>
                                         <p:attrNameLst>
                                           <p:attrName>style.visibility</p:attrName>
@@ -7553,7 +9772,7 @@
                                       <p:cBhvr additive="base">
                                         <p:cTn id="17" dur="500" fill="hold"/>
                                         <p:tgtEl>
-                                          <p:spTgt spid="8"/>
+                                          <p:spTgt spid="15"/>
                                         </p:tgtEl>
                                         <p:attrNameLst>
                                           <p:attrName>ppt_x</p:attrName>
@@ -7576,7 +9795,98 @@
                                       <p:cBhvr additive="base">
                                         <p:cTn id="18" dur="500" fill="hold"/>
                                         <p:tgtEl>
-                                          <p:spTgt spid="8"/>
+                                          <p:spTgt spid="15"/>
+                                        </p:tgtEl>
+                                        <p:attrNameLst>
+                                          <p:attrName>ppt_y</p:attrName>
+                                        </p:attrNameLst>
+                                      </p:cBhvr>
+                                      <p:tavLst>
+                                        <p:tav tm="0">
+                                          <p:val>
+                                            <p:strVal val="1+#ppt_h/2"/>
+                                          </p:val>
+                                        </p:tav>
+                                        <p:tav tm="100000">
+                                          <p:val>
+                                            <p:strVal val="#ppt_y"/>
+                                          </p:val>
+                                        </p:tav>
+                                      </p:tavLst>
+                                    </p:anim>
+                                  </p:childTnLst>
+                                </p:cTn>
+                              </p:par>
+                            </p:childTnLst>
+                          </p:cTn>
+                        </p:par>
+                      </p:childTnLst>
+                    </p:cTn>
+                  </p:par>
+                  <p:par>
+                    <p:cTn id="19" fill="hold">
+                      <p:stCondLst>
+                        <p:cond delay="indefinite"/>
+                      </p:stCondLst>
+                      <p:childTnLst>
+                        <p:par>
+                          <p:cTn id="20" fill="hold">
+                            <p:stCondLst>
+                              <p:cond delay="0"/>
+                            </p:stCondLst>
+                            <p:childTnLst>
+                              <p:par>
+                                <p:cTn id="21" presetID="2" presetClass="entr" presetSubtype="4" fill="hold" grpId="0" nodeType="clickEffect">
+                                  <p:stCondLst>
+                                    <p:cond delay="0"/>
+                                  </p:stCondLst>
+                                  <p:childTnLst>
+                                    <p:set>
+                                      <p:cBhvr>
+                                        <p:cTn id="22" dur="1" fill="hold">
+                                          <p:stCondLst>
+                                            <p:cond delay="0"/>
+                                          </p:stCondLst>
+                                        </p:cTn>
+                                        <p:tgtEl>
+                                          <p:spTgt spid="16"/>
+                                        </p:tgtEl>
+                                        <p:attrNameLst>
+                                          <p:attrName>style.visibility</p:attrName>
+                                        </p:attrNameLst>
+                                      </p:cBhvr>
+                                      <p:to>
+                                        <p:strVal val="visible"/>
+                                      </p:to>
+                                    </p:set>
+                                    <p:anim calcmode="lin" valueType="num">
+                                      <p:cBhvr additive="base">
+                                        <p:cTn id="23" dur="500" fill="hold"/>
+                                        <p:tgtEl>
+                                          <p:spTgt spid="16"/>
+                                        </p:tgtEl>
+                                        <p:attrNameLst>
+                                          <p:attrName>ppt_x</p:attrName>
+                                        </p:attrNameLst>
+                                      </p:cBhvr>
+                                      <p:tavLst>
+                                        <p:tav tm="0">
+                                          <p:val>
+                                            <p:strVal val="#ppt_x"/>
+                                          </p:val>
+                                        </p:tav>
+                                        <p:tav tm="100000">
+                                          <p:val>
+                                            <p:strVal val="#ppt_x"/>
+                                          </p:val>
+                                        </p:tav>
+                                      </p:tavLst>
+                                    </p:anim>
+                                    <p:anim calcmode="lin" valueType="num">
+                                      <p:cBhvr additive="base">
+                                        <p:cTn id="24" dur="500" fill="hold"/>
+                                        <p:tgtEl>
+                                          <p:spTgt spid="16"/>
                                         </p:tgtEl>
                                         <p:attrNameLst>
                                           <p:attrName>ppt_y</p:attrName>
@@ -7599,20 +9909,20 @@
                                 </p:cTn>
                               </p:par>
                               <p:par>
-                                <p:cTn id="19" presetID="2" presetClass="entr" presetSubtype="4" fill="hold" grpId="0" nodeType="withEffect">
+                                <p:cTn id="25" presetID="2" presetClass="entr" presetSubtype="4" fill="hold" grpId="0" nodeType="withEffect">
                                   <p:stCondLst>
                                     <p:cond delay="0"/>
                                   </p:stCondLst>
                                   <p:childTnLst>
                                     <p:set>
                                       <p:cBhvr>
-                                        <p:cTn id="20" dur="1" fill="hold">
+                                        <p:cTn id="26" dur="1" fill="hold">
                                           <p:stCondLst>
                                             <p:cond delay="0"/>
                                           </p:stCondLst>
                                         </p:cTn>
                                         <p:tgtEl>
-                                          <p:spTgt spid="9"/>
+                                          <p:spTgt spid="17"/>
                                         </p:tgtEl>
                                         <p:attrNameLst>
                                           <p:attrName>style.visibility</p:attrName>
@@ -7624,9 +9934,9 @@
                                     </p:set>
                                     <p:anim calcmode="lin" valueType="num">
                                       <p:cBhvr additive="base">
-                                        <p:cTn id="21" dur="500" fill="hold"/>
+                                        <p:cTn id="27" dur="500" fill="hold"/>
                                         <p:tgtEl>
-                                          <p:spTgt spid="9"/>
+                                          <p:spTgt spid="17"/>
                                         </p:tgtEl>
                                         <p:attrNameLst>
                                           <p:attrName>ppt_x</p:attrName>
@@ -7647,9 +9957,9 @@
                                     </p:anim>
                                     <p:anim calcmode="lin" valueType="num">
                                       <p:cBhvr additive="base">
-                                        <p:cTn id="22" dur="500" fill="hold"/>
+                                        <p:cTn id="28" dur="500" fill="hold"/>
                                         <p:tgtEl>
-                                          <p:spTgt spid="9"/>
+                                          <p:spTgt spid="17"/>
                                         </p:tgtEl>
                                         <p:attrNameLst>
                                           <p:attrName>ppt_y</p:attrName>
@@ -7699,712 +10009,10 @@
       </p:par>
     </p:tnLst>
     <p:bldLst>
-      <p:bldP spid="6" grpId="0"/>
-      <p:bldP spid="7" grpId="0"/>
-      <p:bldP spid="8" grpId="0"/>
-      <p:bldP spid="9" grpId="0"/>
-    </p:bldLst>
-  </p:timing>
-</p:sld>
-</file>
-
-<file path=ppt/slides/slide9.xml><?xml version="1.0" encoding="utf-8"?>
-<p:sld xmlns:a="http://schemas.openxmlformats.org/drawingml/2006/main" xmlns:r="http://schemas.openxmlformats.org/officeDocument/2006/relationships" xmlns:p="http://schemas.openxmlformats.org/presentationml/2006/main">
-  <p:cSld>
-    <p:spTree>
-      <p:nvGrpSpPr>
-        <p:cNvPr id="1" name=""/>
-        <p:cNvGrpSpPr/>
-        <p:nvPr/>
-      </p:nvGrpSpPr>
-      <p:grpSpPr>
-        <a:xfrm>
-          <a:off x="0" y="0"/>
-          <a:ext cx="0" cy="0"/>
-          <a:chOff x="0" y="0"/>
-          <a:chExt cx="0" cy="0"/>
-        </a:xfrm>
-      </p:grpSpPr>
-      <p:sp>
-        <p:nvSpPr>
-          <p:cNvPr id="544" name="Shape 544"/>
-          <p:cNvSpPr>
-            <a:spLocks noGrp="1"/>
-          </p:cNvSpPr>
-          <p:nvPr>
-            <p:ph type="sldNum" sz="quarter" idx="4294967295"/>
-          </p:nvPr>
-        </p:nvSpPr>
-        <p:spPr>
-          <a:xfrm>
-            <a:off x="23848993" y="13015731"/>
-            <a:ext cx="362280" cy="369332"/>
-          </a:xfrm>
-          <a:prstGeom prst="rect">
-            <a:avLst/>
-          </a:prstGeom>
-        </p:spPr>
-        <p:txBody>
-          <a:bodyPr/>
-          <a:lstStyle/>
-          <a:p>
-            <a:pPr lvl="0">
-              <a:defRPr sz="1800">
-                <a:solidFill>
-                  <a:srgbClr val="000000"/>
-                </a:solidFill>
-              </a:defRPr>
-            </a:pPr>
-            <a:fld id="{86CB4B4D-7CA3-9044-876B-883B54F8677D}" type="slidenum">
-              <a:rPr sz="2400">
-                <a:solidFill>
-                  <a:srgbClr val="E6E4E8"/>
-                </a:solidFill>
-                <a:latin typeface="+mn-lt"/>
-                <a:ea typeface="+mn-ea"/>
-                <a:cs typeface="+mn-ea"/>
-                <a:sym typeface="+mn-lt"/>
-              </a:rPr>
-            </a:fld>
-            <a:endParaRPr sz="2400">
-              <a:solidFill>
-                <a:srgbClr val="E6E4E8"/>
-              </a:solidFill>
-              <a:latin typeface="+mn-lt"/>
-              <a:ea typeface="+mn-ea"/>
-              <a:cs typeface="+mn-ea"/>
-              <a:sym typeface="+mn-lt"/>
-            </a:endParaRPr>
-          </a:p>
-        </p:txBody>
-      </p:sp>
-      <p:sp>
-        <p:nvSpPr>
-          <p:cNvPr id="546" name="Shape 546"/>
-          <p:cNvSpPr/>
-          <p:nvPr/>
-        </p:nvSpPr>
-        <p:spPr>
-          <a:xfrm>
-            <a:off x="891400" y="990127"/>
-            <a:ext cx="23713401" cy="778510"/>
-          </a:xfrm>
-          <a:prstGeom prst="rect">
-            <a:avLst/>
-          </a:prstGeom>
-          <a:ln w="12700">
-            <a:miter lim="400000"/>
-          </a:ln>
-        </p:spPr>
-        <p:txBody>
-          <a:bodyPr lIns="50800" tIns="50800" rIns="50800" bIns="50800" anchor="ctr">
-            <a:spAutoFit/>
-          </a:bodyPr>
-          <a:lstStyle/>
-          <a:p>
-            <a:pPr lvl="0" algn="l">
-              <a:defRPr sz="1800">
-                <a:solidFill>
-                  <a:srgbClr val="000000"/>
-                </a:solidFill>
-              </a:defRPr>
-            </a:pPr>
-            <a:r>
-              <a:rPr lang="zh-CN" sz="4400">
-                <a:solidFill>
-                  <a:srgbClr val="6F1F35"/>
-                </a:solidFill>
-                <a:cs typeface="+mn-ea"/>
-                <a:sym typeface="+mn-lt"/>
-              </a:rPr>
-              <a:t>实验三：案例分析</a:t>
-            </a:r>
-            <a:r>
-              <a:rPr lang="en-US" altLang="zh-CN" sz="4400">
-                <a:solidFill>
-                  <a:srgbClr val="6F1F35"/>
-                </a:solidFill>
-                <a:cs typeface="+mn-ea"/>
-                <a:sym typeface="+mn-lt"/>
-              </a:rPr>
-              <a:t>&amp;</a:t>
-            </a:r>
-            <a:r>
-              <a:rPr lang="zh-CN" altLang="en-US" sz="4400">
-                <a:solidFill>
-                  <a:srgbClr val="6F1F35"/>
-                </a:solidFill>
-                <a:cs typeface="+mn-ea"/>
-                <a:sym typeface="+mn-lt"/>
-              </a:rPr>
-              <a:t>网络可视化</a:t>
-            </a:r>
-            <a:endParaRPr sz="4400">
-              <a:solidFill>
-                <a:srgbClr val="6F1F35"/>
-              </a:solidFill>
-              <a:cs typeface="+mn-ea"/>
-              <a:sym typeface="+mn-lt"/>
-            </a:endParaRPr>
-          </a:p>
-        </p:txBody>
-      </p:sp>
-      <p:sp>
-        <p:nvSpPr>
-          <p:cNvPr id="547" name="Shape 547"/>
-          <p:cNvSpPr/>
-          <p:nvPr/>
-        </p:nvSpPr>
-        <p:spPr>
-          <a:xfrm flipV="1">
-            <a:off x="458807" y="7562468"/>
-            <a:ext cx="23466386" cy="1"/>
-          </a:xfrm>
-          <a:prstGeom prst="line">
-            <a:avLst/>
-          </a:prstGeom>
-          <a:ln w="50800">
-            <a:solidFill>
-              <a:srgbClr val="6F1F35"/>
-            </a:solidFill>
-            <a:prstDash val="sysDot"/>
-            <a:miter lim="400000"/>
-          </a:ln>
-        </p:spPr>
-        <p:txBody>
-          <a:bodyPr lIns="0" tIns="0" rIns="0" bIns="0" anchor="ctr"/>
-          <a:lstStyle/>
-          <a:p>
-            <a:pPr lvl="0">
-              <a:defRPr sz="3600"/>
-            </a:pPr>
-            <a:endParaRPr>
-              <a:cs typeface="+mn-ea"/>
-              <a:sym typeface="+mn-lt"/>
-            </a:endParaRPr>
-          </a:p>
-        </p:txBody>
-      </p:sp>
-      <p:sp>
-        <p:nvSpPr>
-          <p:cNvPr id="548" name="Shape 548"/>
-          <p:cNvSpPr/>
-          <p:nvPr/>
-        </p:nvSpPr>
-        <p:spPr>
-          <a:xfrm>
-            <a:off x="10619105" y="3818890"/>
-            <a:ext cx="5528310" cy="2153920"/>
-          </a:xfrm>
-          <a:prstGeom prst="rect">
-            <a:avLst/>
-          </a:prstGeom>
-          <a:ln w="12700">
-            <a:miter lim="400000"/>
-          </a:ln>
-        </p:spPr>
-        <p:txBody>
-          <a:bodyPr wrap="square" lIns="0" tIns="0" rIns="0" bIns="0">
-            <a:spAutoFit/>
-          </a:bodyPr>
-          <a:lstStyle>
-            <a:lvl1pPr algn="l">
-              <a:defRPr sz="2400">
-                <a:solidFill>
-                  <a:srgbClr val="4F5761"/>
-                </a:solidFill>
-                <a:latin typeface="Lato"/>
-                <a:ea typeface="Lato"/>
-                <a:cs typeface="Lato"/>
-                <a:sym typeface="Lato"/>
-              </a:defRPr>
-            </a:lvl1pPr>
-          </a:lstStyle>
-          <a:p>
-            <a:pPr lvl="0">
-              <a:defRPr sz="1800">
-                <a:solidFill>
-                  <a:srgbClr val="000000"/>
-                </a:solidFill>
-              </a:defRPr>
-            </a:pPr>
-            <a:r>
-              <a:rPr lang="zh-CN" sz="2800">
-                <a:solidFill>
-                  <a:srgbClr val="4F5761"/>
-                </a:solidFill>
-                <a:latin typeface="+mn-lt"/>
-                <a:ea typeface="+mn-ea"/>
-                <a:cs typeface="+mn-ea"/>
-                <a:sym typeface="+mn-lt"/>
-              </a:rPr>
-              <a:t>我们以药物</a:t>
-            </a:r>
-            <a:r>
-              <a:rPr lang="en-US" altLang="zh-CN" sz="2800">
-                <a:solidFill>
-                  <a:srgbClr val="4F5761"/>
-                </a:solidFill>
-                <a:latin typeface="+mn-lt"/>
-                <a:ea typeface="+mn-ea"/>
-                <a:cs typeface="+mn-ea"/>
-                <a:sym typeface="+mn-lt"/>
-              </a:rPr>
-              <a:t>-</a:t>
-            </a:r>
-            <a:r>
-              <a:rPr lang="zh-CN" altLang="en-US" sz="2800">
-                <a:solidFill>
-                  <a:srgbClr val="4F5761"/>
-                </a:solidFill>
-                <a:latin typeface="+mn-lt"/>
-                <a:ea typeface="+mn-ea"/>
-                <a:cs typeface="+mn-ea"/>
-                <a:sym typeface="+mn-lt"/>
-              </a:rPr>
-              <a:t>药物关联数据为例，挑选出了预测结果中前十个最有可能发生的关联（非先验数据），表中加粗行代表通过其它渠道被验证为真实存在的药物间关联。</a:t>
-            </a:r>
-            <a:endParaRPr lang="zh-CN" altLang="en-US" sz="2800">
-              <a:solidFill>
-                <a:srgbClr val="4F5761"/>
-              </a:solidFill>
-              <a:latin typeface="+mn-lt"/>
-              <a:ea typeface="+mn-ea"/>
-              <a:cs typeface="+mn-ea"/>
-              <a:sym typeface="+mn-lt"/>
-            </a:endParaRPr>
-          </a:p>
-        </p:txBody>
-      </p:sp>
-      <p:sp>
-        <p:nvSpPr>
-          <p:cNvPr id="549" name="Shape 549"/>
-          <p:cNvSpPr/>
-          <p:nvPr/>
-        </p:nvSpPr>
-        <p:spPr>
-          <a:xfrm>
-            <a:off x="16963672" y="3603582"/>
-            <a:ext cx="5650472" cy="2585085"/>
-          </a:xfrm>
-          <a:prstGeom prst="rect">
-            <a:avLst/>
-          </a:prstGeom>
-          <a:ln w="12700">
-            <a:miter lim="400000"/>
-          </a:ln>
-        </p:spPr>
-        <p:txBody>
-          <a:bodyPr lIns="0" tIns="0" rIns="0" bIns="0">
-            <a:spAutoFit/>
-          </a:bodyPr>
-          <a:lstStyle>
-            <a:lvl1pPr algn="l">
-              <a:defRPr sz="2000">
-                <a:solidFill>
-                  <a:srgbClr val="4F5761"/>
-                </a:solidFill>
-                <a:latin typeface="Lato Light"/>
-                <a:ea typeface="Lato Light"/>
-                <a:cs typeface="Lato Light"/>
-                <a:sym typeface="Lato Light"/>
-              </a:defRPr>
-            </a:lvl1pPr>
-          </a:lstStyle>
-          <a:p>
-            <a:pPr lvl="0">
-              <a:defRPr sz="1800">
-                <a:solidFill>
-                  <a:srgbClr val="000000"/>
-                </a:solidFill>
-              </a:defRPr>
-            </a:pPr>
-            <a:r>
-              <a:rPr lang="zh-CN" sz="2800">
-                <a:solidFill>
-                  <a:srgbClr val="4F5761"/>
-                </a:solidFill>
-                <a:latin typeface="+mn-lt"/>
-                <a:ea typeface="+mn-ea"/>
-                <a:cs typeface="+mn-ea"/>
-                <a:sym typeface="+mn-lt"/>
-              </a:rPr>
-              <a:t>表中第七行我们预测出了一例帕罗西丁和盐酸多奈哌齐的相互作用。其中，前者是一类被广泛认为极易发生药物互作的抗抑郁药物，它和后者共同使用时会抑制药物的代谢作用，从而相互影响药效。</a:t>
-            </a:r>
-            <a:endParaRPr lang="zh-CN" sz="2800">
-              <a:solidFill>
-                <a:srgbClr val="4F5761"/>
-              </a:solidFill>
-              <a:latin typeface="+mn-lt"/>
-              <a:ea typeface="+mn-ea"/>
-              <a:cs typeface="+mn-ea"/>
-              <a:sym typeface="+mn-lt"/>
-            </a:endParaRPr>
-          </a:p>
-        </p:txBody>
-      </p:sp>
-      <p:sp>
-        <p:nvSpPr>
-          <p:cNvPr id="551" name="Shape 551"/>
-          <p:cNvSpPr/>
-          <p:nvPr/>
-        </p:nvSpPr>
-        <p:spPr>
-          <a:xfrm>
-            <a:off x="2694305" y="10090150"/>
-            <a:ext cx="7555230" cy="1723390"/>
-          </a:xfrm>
-          <a:prstGeom prst="rect">
-            <a:avLst/>
-          </a:prstGeom>
-          <a:ln w="12700">
-            <a:miter lim="400000"/>
-          </a:ln>
-        </p:spPr>
-        <p:txBody>
-          <a:bodyPr wrap="square" lIns="0" tIns="0" rIns="0" bIns="0">
-            <a:spAutoFit/>
-          </a:bodyPr>
-          <a:lstStyle>
-            <a:lvl1pPr algn="l">
-              <a:defRPr sz="2000">
-                <a:solidFill>
-                  <a:srgbClr val="4F5761"/>
-                </a:solidFill>
-                <a:latin typeface="Lato Light"/>
-                <a:ea typeface="Lato Light"/>
-                <a:cs typeface="Lato Light"/>
-                <a:sym typeface="Lato Light"/>
-              </a:defRPr>
-            </a:lvl1pPr>
-          </a:lstStyle>
-          <a:p>
-            <a:pPr lvl="0">
-              <a:defRPr sz="1800">
-                <a:solidFill>
-                  <a:srgbClr val="000000"/>
-                </a:solidFill>
-              </a:defRPr>
-            </a:pPr>
-            <a:r>
-              <a:rPr lang="zh-CN" sz="2800">
-                <a:solidFill>
-                  <a:srgbClr val="4F5761"/>
-                </a:solidFill>
-                <a:latin typeface="+mn-lt"/>
-                <a:ea typeface="+mn-ea"/>
-                <a:cs typeface="+mn-ea"/>
-                <a:sym typeface="+mn-lt"/>
-              </a:rPr>
-              <a:t>以表中涉及的药物为例，我们找到了与之相关的所有药物并依此画出了如右图所示的药物</a:t>
-            </a:r>
-            <a:r>
-              <a:rPr lang="en-US" altLang="zh-CN" sz="2800">
-                <a:solidFill>
-                  <a:srgbClr val="4F5761"/>
-                </a:solidFill>
-                <a:latin typeface="+mn-lt"/>
-                <a:ea typeface="+mn-ea"/>
-                <a:cs typeface="+mn-ea"/>
-                <a:sym typeface="+mn-lt"/>
-              </a:rPr>
-              <a:t>-</a:t>
-            </a:r>
-            <a:r>
-              <a:rPr lang="zh-CN" altLang="en-US" sz="2800">
-                <a:solidFill>
-                  <a:srgbClr val="4F5761"/>
-                </a:solidFill>
-                <a:latin typeface="+mn-lt"/>
-                <a:ea typeface="+mn-ea"/>
-                <a:cs typeface="+mn-ea"/>
-                <a:sym typeface="+mn-lt"/>
-              </a:rPr>
-              <a:t>药物关联网络。从图中可直观地看出预测药物的度分布以及相互间的关系。</a:t>
-            </a:r>
-            <a:endParaRPr lang="zh-CN" altLang="en-US" sz="2800">
-              <a:solidFill>
-                <a:srgbClr val="4F5761"/>
-              </a:solidFill>
-              <a:latin typeface="+mn-lt"/>
-              <a:ea typeface="+mn-ea"/>
-              <a:cs typeface="+mn-ea"/>
-              <a:sym typeface="+mn-lt"/>
-            </a:endParaRPr>
-          </a:p>
-        </p:txBody>
-      </p:sp>
-      <p:pic>
-        <p:nvPicPr>
-          <p:cNvPr id="498" name="图像" descr="图像"/>
-          <p:cNvPicPr>
-            <a:picLocks noChangeAspect="1"/>
-          </p:cNvPicPr>
-          <p:nvPr/>
-        </p:nvPicPr>
-        <p:blipFill>
-          <a:blip r:embed="rId1"/>
-          <a:stretch>
-            <a:fillRect/>
-          </a:stretch>
-        </p:blipFill>
-        <p:spPr>
-          <a:xfrm>
-            <a:off x="1527810" y="2060575"/>
-            <a:ext cx="7938135" cy="5379720"/>
-          </a:xfrm>
-          <a:prstGeom prst="rect">
-            <a:avLst/>
-          </a:prstGeom>
-          <a:ln w="12700">
-            <a:miter lim="400000"/>
-            <a:headEnd/>
-            <a:tailEnd/>
-          </a:ln>
-        </p:spPr>
-      </p:pic>
-      <p:pic>
-        <p:nvPicPr>
-          <p:cNvPr id="495" name="network.pdf" descr="network.pdf"/>
-          <p:cNvPicPr>
-            <a:picLocks noChangeAspect="1"/>
-          </p:cNvPicPr>
-          <p:nvPr/>
-        </p:nvPicPr>
-        <p:blipFill>
-          <a:blip r:embed="rId2"/>
-          <a:srcRect l="3476" r="3476"/>
-          <a:stretch>
-            <a:fillRect/>
-          </a:stretch>
-        </p:blipFill>
-        <p:spPr>
-          <a:xfrm>
-            <a:off x="12642215" y="8246110"/>
-            <a:ext cx="10309225" cy="5412105"/>
-          </a:xfrm>
-          <a:prstGeom prst="rect">
-            <a:avLst/>
-          </a:prstGeom>
-          <a:ln w="12700">
-            <a:miter lim="400000"/>
-            <a:headEnd/>
-            <a:tailEnd/>
-          </a:ln>
-        </p:spPr>
-      </p:pic>
-    </p:spTree>
-  </p:cSld>
-  <p:clrMapOvr>
-    <a:masterClrMapping/>
-  </p:clrMapOvr>
-  <mc:AlternateContent xmlns:mc="http://schemas.openxmlformats.org/markup-compatibility/2006">
-    <mc:Choice xmlns:p15="http://schemas.microsoft.com/office/powerpoint/2012/main" Requires="p15">
-      <p:transition xmlns:p14="http://schemas.microsoft.com/office/powerpoint/2010/main" Requires="p14" p14:dur="500">
-        <p15:prstTrans prst="pageCurlDouble"/>
-      </p:transition>
-    </mc:Choice>
-    <mc:Fallback>
-      <p:transition>
-        <p:fade/>
-      </p:transition>
-    </mc:Fallback>
-  </mc:AlternateContent>
-  <p:timing>
-    <p:tnLst>
-      <p:par>
-        <p:cTn id="1" dur="indefinite" restart="never" fill="hold" nodeType="tmRoot">
-          <p:childTnLst>
-            <p:seq concurrent="1" nextAc="seek">
-              <p:cTn id="2" dur="indefinite" nodeType="mainSeq">
-                <p:childTnLst>
-                  <p:par>
-                    <p:cTn id="3" fill="hold">
-                      <p:stCondLst>
-                        <p:cond delay="indefinite"/>
-                      </p:stCondLst>
-                      <p:childTnLst>
-                        <p:par>
-                          <p:cTn id="4" fill="hold">
-                            <p:stCondLst>
-                              <p:cond delay="0"/>
-                            </p:stCondLst>
-                            <p:childTnLst>
-                              <p:par>
-                                <p:cTn id="5" presetID="2" presetClass="entr" presetSubtype="4" fill="hold" grpId="0" nodeType="clickEffect">
-                                  <p:stCondLst>
-                                    <p:cond delay="0"/>
-                                  </p:stCondLst>
-                                  <p:childTnLst>
-                                    <p:set>
-                                      <p:cBhvr>
-                                        <p:cTn id="6" dur="1" fill="hold">
-                                          <p:stCondLst>
-                                            <p:cond delay="0"/>
-                                          </p:stCondLst>
-                                        </p:cTn>
-                                        <p:tgtEl>
-                                          <p:spTgt spid="551"/>
-                                        </p:tgtEl>
-                                        <p:attrNameLst>
-                                          <p:attrName>style.visibility</p:attrName>
-                                        </p:attrNameLst>
-                                      </p:cBhvr>
-                                      <p:to>
-                                        <p:strVal val="visible"/>
-                                      </p:to>
-                                    </p:set>
-                                    <p:anim calcmode="lin" valueType="num">
-                                      <p:cBhvr additive="base">
-                                        <p:cTn id="7" dur="500" fill="hold"/>
-                                        <p:tgtEl>
-                                          <p:spTgt spid="551"/>
-                                        </p:tgtEl>
-                                        <p:attrNameLst>
-                                          <p:attrName>ppt_x</p:attrName>
-                                        </p:attrNameLst>
-                                      </p:cBhvr>
-                                      <p:tavLst>
-                                        <p:tav tm="0">
-                                          <p:val>
-                                            <p:strVal val="#ppt_x"/>
-                                          </p:val>
-                                        </p:tav>
-                                        <p:tav tm="100000">
-                                          <p:val>
-                                            <p:strVal val="#ppt_x"/>
-                                          </p:val>
-                                        </p:tav>
-                                      </p:tavLst>
-                                    </p:anim>
-                                    <p:anim calcmode="lin" valueType="num">
-                                      <p:cBhvr additive="base">
-                                        <p:cTn id="8" dur="500" fill="hold"/>
-                                        <p:tgtEl>
-                                          <p:spTgt spid="551"/>
-                                        </p:tgtEl>
-                                        <p:attrNameLst>
-                                          <p:attrName>ppt_y</p:attrName>
-                                        </p:attrNameLst>
-                                      </p:cBhvr>
-                                      <p:tavLst>
-                                        <p:tav tm="0">
-                                          <p:val>
-                                            <p:strVal val="1+#ppt_h/2"/>
-                                          </p:val>
-                                        </p:tav>
-                                        <p:tav tm="100000">
-                                          <p:val>
-                                            <p:strVal val="#ppt_y"/>
-                                          </p:val>
-                                        </p:tav>
-                                      </p:tavLst>
-                                    </p:anim>
-                                  </p:childTnLst>
-                                </p:cTn>
-                              </p:par>
-                              <p:par>
-                                <p:cTn id="9" presetID="2" presetClass="entr" presetSubtype="4" fill="hold" nodeType="withEffect">
-                                  <p:stCondLst>
-                                    <p:cond delay="0"/>
-                                  </p:stCondLst>
-                                  <p:childTnLst>
-                                    <p:set>
-                                      <p:cBhvr>
-                                        <p:cTn id="10" dur="1" fill="hold">
-                                          <p:stCondLst>
-                                            <p:cond delay="0"/>
-                                          </p:stCondLst>
-                                        </p:cTn>
-                                        <p:tgtEl>
-                                          <p:spTgt spid="495"/>
-                                        </p:tgtEl>
-                                        <p:attrNameLst>
-                                          <p:attrName>style.visibility</p:attrName>
-                                        </p:attrNameLst>
-                                      </p:cBhvr>
-                                      <p:to>
-                                        <p:strVal val="visible"/>
-                                      </p:to>
-                                    </p:set>
-                                    <p:anim calcmode="lin" valueType="num">
-                                      <p:cBhvr additive="base">
-                                        <p:cTn id="11" dur="500" fill="hold"/>
-                                        <p:tgtEl>
-                                          <p:spTgt spid="495"/>
-                                        </p:tgtEl>
-                                        <p:attrNameLst>
-                                          <p:attrName>ppt_x</p:attrName>
-                                        </p:attrNameLst>
-                                      </p:cBhvr>
-                                      <p:tavLst>
-                                        <p:tav tm="0">
-                                          <p:val>
-                                            <p:strVal val="#ppt_x"/>
-                                          </p:val>
-                                        </p:tav>
-                                        <p:tav tm="100000">
-                                          <p:val>
-                                            <p:strVal val="#ppt_x"/>
-                                          </p:val>
-                                        </p:tav>
-                                      </p:tavLst>
-                                    </p:anim>
-                                    <p:anim calcmode="lin" valueType="num">
-                                      <p:cBhvr additive="base">
-                                        <p:cTn id="12" dur="500" fill="hold"/>
-                                        <p:tgtEl>
-                                          <p:spTgt spid="495"/>
-                                        </p:tgtEl>
-                                        <p:attrNameLst>
-                                          <p:attrName>ppt_y</p:attrName>
-                                        </p:attrNameLst>
-                                      </p:cBhvr>
-                                      <p:tavLst>
-                                        <p:tav tm="0">
-                                          <p:val>
-                                            <p:strVal val="1+#ppt_h/2"/>
-                                          </p:val>
-                                        </p:tav>
-                                        <p:tav tm="100000">
-                                          <p:val>
-                                            <p:strVal val="#ppt_y"/>
-                                          </p:val>
-                                        </p:tav>
-                                      </p:tavLst>
-                                    </p:anim>
-                                  </p:childTnLst>
-                                </p:cTn>
-                              </p:par>
-                            </p:childTnLst>
-                          </p:cTn>
-                        </p:par>
-                      </p:childTnLst>
-                    </p:cTn>
-                  </p:par>
-                </p:childTnLst>
-              </p:cTn>
-              <p:prevCondLst>
-                <p:cond evt="onPrev" delay="0">
-                  <p:tgtEl>
-                    <p:sldTgt/>
-                  </p:tgtEl>
-                </p:cond>
-              </p:prevCondLst>
-              <p:nextCondLst>
-                <p:cond evt="onNext" delay="0">
-                  <p:tgtEl>
-                    <p:sldTgt/>
-                  </p:tgtEl>
-                </p:cond>
-              </p:nextCondLst>
-            </p:seq>
-          </p:childTnLst>
-        </p:cTn>
-      </p:par>
-    </p:tnLst>
-    <p:bldLst>
-      <p:bldP spid="551" grpId="0"/>
+      <p:bldP spid="14" grpId="0"/>
+      <p:bldP spid="15" grpId="0"/>
+      <p:bldP spid="16" grpId="0"/>
+      <p:bldP spid="17" grpId="0"/>
     </p:bldLst>
   </p:timing>
 </p:sld>

</xml_diff>

<commit_message>
fix Slides autoplay issue
</commit_message>
<xml_diff>
--- a/答辩/正式答辩.pptx
+++ b/答辩/正式答辩.pptx
@@ -4119,15 +4119,11 @@
     <a:masterClrMapping/>
   </p:clrMapOvr>
   <mc:AlternateContent xmlns:mc="http://schemas.openxmlformats.org/markup-compatibility/2006">
-    <mc:Choice xmlns:p15="http://schemas.microsoft.com/office/powerpoint/2012/main" Requires="p15">
-      <p:transition xmlns:p14="http://schemas.microsoft.com/office/powerpoint/2010/main" Requires="p14" p14:dur="500">
-        <p15:prstTrans prst="pageCurlDouble"/>
-      </p:transition>
+    <mc:Choice xmlns:p14="http://schemas.microsoft.com/office/powerpoint/2010/main" Requires="p14">
+      <p:transition p14:dur="500"/>
     </mc:Choice>
     <mc:Fallback>
-      <p:transition>
-        <p:fade/>
-      </p:transition>
+      <p:transition/>
     </mc:Fallback>
   </mc:AlternateContent>
   <p:timing>
@@ -4717,7 +4713,7 @@
                 <a:cs typeface="+mn-ea"/>
                 <a:sym typeface="+mn-lt"/>
               </a:rPr>
-              <a:t>第一章 绪论</a:t>
+              <a:t>第一章 概述</a:t>
             </a:r>
             <a:endParaRPr lang="zh-CN" altLang="en-US" sz="4000" dirty="0">
               <a:solidFill>
@@ -6613,7 +6609,7 @@
                 <a:cs typeface="+mn-ea"/>
                 <a:sym typeface="+mn-lt"/>
               </a:rPr>
-              <a:t>#</a:t>
+              <a:t># </a:t>
             </a:r>
             <a:r>
               <a:rPr lang="zh-CN" sz="2400">
@@ -8554,7 +8550,31 @@
                 <a:cs typeface="+mn-ea"/>
                 <a:sym typeface="+mn-lt"/>
               </a:rPr>
-              <a:t>仅通过对比表格数据来判断算法的优劣，这并不严谨，还需要通过统计分析给出统计意义上的结论。为此，论文又进行了弗里德曼检验，在计算出了临界值域后得到了如上图所示的结果。圆点代表算法的平均性能，横线为临界值域。</a:t>
+              <a:t>仅通过对比表格数据来判断算法的优劣，这并不严谨，还需要通过统计分析给出统计意义上的结论。为此，论文又进行了弗里德曼检验，在计算出了临界值域后得到了如上图所示的结果。圆点代表算法的平均性能，横线为临界值域，若直线间没有重叠则代表算法之间存在</a:t>
+            </a:r>
+            <a:r>
+              <a:rPr lang="zh-CN" sz="3200" dirty="0" err="1">
+                <a:solidFill>
+                  <a:srgbClr val="4F5761"/>
+                </a:solidFill>
+                <a:latin typeface="+mj-lt"/>
+                <a:ea typeface="+mj-lt"/>
+                <a:cs typeface="+mn-ea"/>
+                <a:sym typeface="+mn-lt"/>
+              </a:rPr>
+              <a:t>显著差异</a:t>
+            </a:r>
+            <a:r>
+              <a:rPr lang="zh-CN" sz="3200" dirty="0" err="1">
+                <a:solidFill>
+                  <a:srgbClr val="4F5761"/>
+                </a:solidFill>
+                <a:latin typeface="+mj-lt"/>
+                <a:ea typeface="+mj-lt"/>
+                <a:cs typeface="+mn-ea"/>
+                <a:sym typeface="+mn-lt"/>
+              </a:rPr>
+              <a:t>。</a:t>
             </a:r>
             <a:endParaRPr kumimoji="0" lang="zh-CN" altLang="en-US" sz="3200" b="0" i="0" u="none" strike="noStrike" cap="none" spc="0" normalizeH="0" baseline="0" dirty="0" err="1">
               <a:ln>
@@ -9549,15 +9569,11 @@
     <a:masterClrMapping/>
   </p:clrMapOvr>
   <mc:AlternateContent xmlns:mc="http://schemas.openxmlformats.org/markup-compatibility/2006">
-    <mc:Choice xmlns:p15="http://schemas.microsoft.com/office/powerpoint/2012/main" Requires="p15">
-      <p:transition xmlns:p14="http://schemas.microsoft.com/office/powerpoint/2010/main" Requires="p14" p14:dur="500">
-        <p15:prstTrans prst="pageCurlDouble"/>
-      </p:transition>
+    <mc:Choice xmlns:p14="http://schemas.microsoft.com/office/powerpoint/2010/main" Requires="p14">
+      <p:transition p14:dur="500"/>
     </mc:Choice>
     <mc:Fallback>
-      <p:transition>
-        <p:fade/>
-      </p:transition>
+      <p:transition/>
     </mc:Fallback>
   </mc:AlternateContent>
   <p:timing>

</xml_diff>